<commit_message>
updated testbed overview fig
</commit_message>
<xml_diff>
--- a/docs/Testbed-Design/figures/reThinkTestbedFigures.pptx
+++ b/docs/Testbed-Design/figures/reThinkTestbedFigures.pptx
@@ -1,6 +1,6 @@
 
 <file path=ppt/presentation.xml><?xml version="1.0" encoding="utf-8"?>
-<p:presentation xmlns:a="http://schemas.openxmlformats.org/drawingml/2006/main" xmlns:r="http://schemas.openxmlformats.org/officeDocument/2006/relationships" xmlns:p="http://schemas.openxmlformats.org/presentationml/2006/main" saveSubsetFonts="1">
+<p:presentation xmlns:a="http://schemas.openxmlformats.org/drawingml/2006/main" xmlns:r="http://schemas.openxmlformats.org/officeDocument/2006/relationships" xmlns:mc="http://schemas.openxmlformats.org/markup-compatibility/2006" xmlns:mv="urn:schemas-microsoft-com:mac:vml" xmlns:p="http://schemas.openxmlformats.org/presentationml/2006/main" mc:Ignorable="mv" mc:PreserveAttributes="mv:*" saveSubsetFonts="1">
   <p:sldMasterIdLst>
     <p:sldMasterId id="2147483648" r:id="rId1"/>
   </p:sldMasterIdLst>
@@ -116,7 +116,7 @@
 </file>
 
 <file path=ppt/slideLayouts/slideLayout1.xml><?xml version="1.0" encoding="utf-8"?>
-<p:sldLayout xmlns:a="http://schemas.openxmlformats.org/drawingml/2006/main" xmlns:r="http://schemas.openxmlformats.org/officeDocument/2006/relationships" xmlns:p="http://schemas.openxmlformats.org/presentationml/2006/main" type="title" preserve="1">
+<p:sldLayout xmlns:a="http://schemas.openxmlformats.org/drawingml/2006/main" xmlns:r="http://schemas.openxmlformats.org/officeDocument/2006/relationships" xmlns:mc="http://schemas.openxmlformats.org/markup-compatibility/2006" xmlns:mv="urn:schemas-microsoft-com:mac:vml" xmlns:p="http://schemas.openxmlformats.org/presentationml/2006/main" mc:Ignorable="mv" mc:PreserveAttributes="mv:*" type="title" preserve="1">
   <p:cSld name="Diapositive de titre">
     <p:spTree>
       <p:nvGrpSpPr>
@@ -296,7 +296,8 @@
           <a:p>
             <a:fld id="{2C59F9AD-AC7D-47D0-978F-DB0960CE5219}" type="datetimeFigureOut">
               <a:rPr lang="en-US" smtClean="0"/>
-              <a:t>4/8/2016</a:t>
+              <a:pPr/>
+              <a:t>18.04.2016</a:t>
             </a:fld>
             <a:endParaRPr lang="en-US"/>
           </a:p>
@@ -338,7 +339,8 @@
           <a:p>
             <a:fld id="{44CA9420-4552-430C-9878-E0B544A9799E}" type="slidenum">
               <a:rPr lang="en-US" smtClean="0"/>
-              <a:t>‹N°›</a:t>
+              <a:pPr/>
+              <a:t>‹Nr.›</a:t>
             </a:fld>
             <a:endParaRPr lang="en-US"/>
           </a:p>
@@ -347,7 +349,7 @@
     </p:spTree>
     <p:extLst>
       <p:ext uri="{BB962C8B-B14F-4D97-AF65-F5344CB8AC3E}">
-        <p14:creationId xmlns:p14="http://schemas.microsoft.com/office/powerpoint/2010/main" val="1287589428"/>
+        <p14:creationId xmlns:p14="http://schemas.microsoft.com/office/powerpoint/2010/main" xmlns:p="http://schemas.openxmlformats.org/presentationml/2006/main" xmlns:r="http://schemas.openxmlformats.org/officeDocument/2006/relationships" xmlns:a="http://schemas.openxmlformats.org/drawingml/2006/main" xmlns="" val="1287589428"/>
       </p:ext>
     </p:extLst>
   </p:cSld>
@@ -358,7 +360,7 @@
 </file>
 
 <file path=ppt/slideLayouts/slideLayout10.xml><?xml version="1.0" encoding="utf-8"?>
-<p:sldLayout xmlns:a="http://schemas.openxmlformats.org/drawingml/2006/main" xmlns:r="http://schemas.openxmlformats.org/officeDocument/2006/relationships" xmlns:p="http://schemas.openxmlformats.org/presentationml/2006/main" type="vertTx" preserve="1">
+<p:sldLayout xmlns:a="http://schemas.openxmlformats.org/drawingml/2006/main" xmlns:r="http://schemas.openxmlformats.org/officeDocument/2006/relationships" xmlns:mc="http://schemas.openxmlformats.org/markup-compatibility/2006" xmlns:mv="urn:schemas-microsoft-com:mac:vml" xmlns:p="http://schemas.openxmlformats.org/presentationml/2006/main" mc:Ignorable="mv" mc:PreserveAttributes="mv:*" type="vertTx" preserve="1">
   <p:cSld name="Titre et texte vertical">
     <p:spTree>
       <p:nvGrpSpPr>
@@ -466,7 +468,8 @@
           <a:p>
             <a:fld id="{2C59F9AD-AC7D-47D0-978F-DB0960CE5219}" type="datetimeFigureOut">
               <a:rPr lang="en-US" smtClean="0"/>
-              <a:t>4/8/2016</a:t>
+              <a:pPr/>
+              <a:t>18.04.2016</a:t>
             </a:fld>
             <a:endParaRPr lang="en-US"/>
           </a:p>
@@ -508,7 +511,8 @@
           <a:p>
             <a:fld id="{44CA9420-4552-430C-9878-E0B544A9799E}" type="slidenum">
               <a:rPr lang="en-US" smtClean="0"/>
-              <a:t>‹N°›</a:t>
+              <a:pPr/>
+              <a:t>‹Nr.›</a:t>
             </a:fld>
             <a:endParaRPr lang="en-US"/>
           </a:p>
@@ -517,7 +521,7 @@
     </p:spTree>
     <p:extLst>
       <p:ext uri="{BB962C8B-B14F-4D97-AF65-F5344CB8AC3E}">
-        <p14:creationId xmlns:p14="http://schemas.microsoft.com/office/powerpoint/2010/main" val="1240793147"/>
+        <p14:creationId xmlns:p14="http://schemas.microsoft.com/office/powerpoint/2010/main" xmlns:p="http://schemas.openxmlformats.org/presentationml/2006/main" xmlns:r="http://schemas.openxmlformats.org/officeDocument/2006/relationships" xmlns:a="http://schemas.openxmlformats.org/drawingml/2006/main" xmlns="" val="1240793147"/>
       </p:ext>
     </p:extLst>
   </p:cSld>
@@ -528,7 +532,7 @@
 </file>
 
 <file path=ppt/slideLayouts/slideLayout11.xml><?xml version="1.0" encoding="utf-8"?>
-<p:sldLayout xmlns:a="http://schemas.openxmlformats.org/drawingml/2006/main" xmlns:r="http://schemas.openxmlformats.org/officeDocument/2006/relationships" xmlns:p="http://schemas.openxmlformats.org/presentationml/2006/main" type="vertTitleAndTx" preserve="1">
+<p:sldLayout xmlns:a="http://schemas.openxmlformats.org/drawingml/2006/main" xmlns:r="http://schemas.openxmlformats.org/officeDocument/2006/relationships" xmlns:mc="http://schemas.openxmlformats.org/markup-compatibility/2006" xmlns:mv="urn:schemas-microsoft-com:mac:vml" xmlns:p="http://schemas.openxmlformats.org/presentationml/2006/main" mc:Ignorable="mv" mc:PreserveAttributes="mv:*" type="vertTitleAndTx" preserve="1">
   <p:cSld name="Titre vertical et texte">
     <p:spTree>
       <p:nvGrpSpPr>
@@ -646,7 +650,8 @@
           <a:p>
             <a:fld id="{2C59F9AD-AC7D-47D0-978F-DB0960CE5219}" type="datetimeFigureOut">
               <a:rPr lang="en-US" smtClean="0"/>
-              <a:t>4/8/2016</a:t>
+              <a:pPr/>
+              <a:t>18.04.2016</a:t>
             </a:fld>
             <a:endParaRPr lang="en-US"/>
           </a:p>
@@ -688,7 +693,8 @@
           <a:p>
             <a:fld id="{44CA9420-4552-430C-9878-E0B544A9799E}" type="slidenum">
               <a:rPr lang="en-US" smtClean="0"/>
-              <a:t>‹N°›</a:t>
+              <a:pPr/>
+              <a:t>‹Nr.›</a:t>
             </a:fld>
             <a:endParaRPr lang="en-US"/>
           </a:p>
@@ -697,7 +703,7 @@
     </p:spTree>
     <p:extLst>
       <p:ext uri="{BB962C8B-B14F-4D97-AF65-F5344CB8AC3E}">
-        <p14:creationId xmlns:p14="http://schemas.microsoft.com/office/powerpoint/2010/main" val="2172703429"/>
+        <p14:creationId xmlns:p14="http://schemas.microsoft.com/office/powerpoint/2010/main" xmlns:p="http://schemas.openxmlformats.org/presentationml/2006/main" xmlns:r="http://schemas.openxmlformats.org/officeDocument/2006/relationships" xmlns:a="http://schemas.openxmlformats.org/drawingml/2006/main" xmlns="" val="2172703429"/>
       </p:ext>
     </p:extLst>
   </p:cSld>
@@ -708,7 +714,7 @@
 </file>
 
 <file path=ppt/slideLayouts/slideLayout2.xml><?xml version="1.0" encoding="utf-8"?>
-<p:sldLayout xmlns:a="http://schemas.openxmlformats.org/drawingml/2006/main" xmlns:r="http://schemas.openxmlformats.org/officeDocument/2006/relationships" xmlns:p="http://schemas.openxmlformats.org/presentationml/2006/main" type="obj" preserve="1">
+<p:sldLayout xmlns:a="http://schemas.openxmlformats.org/drawingml/2006/main" xmlns:r="http://schemas.openxmlformats.org/officeDocument/2006/relationships" xmlns:mc="http://schemas.openxmlformats.org/markup-compatibility/2006" xmlns:mv="urn:schemas-microsoft-com:mac:vml" xmlns:p="http://schemas.openxmlformats.org/presentationml/2006/main" mc:Ignorable="mv" mc:PreserveAttributes="mv:*" type="obj" preserve="1">
   <p:cSld name="Titre et contenu">
     <p:spTree>
       <p:nvGrpSpPr>
@@ -816,7 +822,8 @@
           <a:p>
             <a:fld id="{2C59F9AD-AC7D-47D0-978F-DB0960CE5219}" type="datetimeFigureOut">
               <a:rPr lang="en-US" smtClean="0"/>
-              <a:t>4/8/2016</a:t>
+              <a:pPr/>
+              <a:t>18.04.2016</a:t>
             </a:fld>
             <a:endParaRPr lang="en-US"/>
           </a:p>
@@ -858,7 +865,8 @@
           <a:p>
             <a:fld id="{44CA9420-4552-430C-9878-E0B544A9799E}" type="slidenum">
               <a:rPr lang="en-US" smtClean="0"/>
-              <a:t>‹N°›</a:t>
+              <a:pPr/>
+              <a:t>‹Nr.›</a:t>
             </a:fld>
             <a:endParaRPr lang="en-US"/>
           </a:p>
@@ -867,7 +875,7 @@
     </p:spTree>
     <p:extLst>
       <p:ext uri="{BB962C8B-B14F-4D97-AF65-F5344CB8AC3E}">
-        <p14:creationId xmlns:p14="http://schemas.microsoft.com/office/powerpoint/2010/main" val="4294398382"/>
+        <p14:creationId xmlns:p14="http://schemas.microsoft.com/office/powerpoint/2010/main" xmlns:p="http://schemas.openxmlformats.org/presentationml/2006/main" xmlns:r="http://schemas.openxmlformats.org/officeDocument/2006/relationships" xmlns:a="http://schemas.openxmlformats.org/drawingml/2006/main" xmlns="" val="4294398382"/>
       </p:ext>
     </p:extLst>
   </p:cSld>
@@ -878,7 +886,7 @@
 </file>
 
 <file path=ppt/slideLayouts/slideLayout3.xml><?xml version="1.0" encoding="utf-8"?>
-<p:sldLayout xmlns:a="http://schemas.openxmlformats.org/drawingml/2006/main" xmlns:r="http://schemas.openxmlformats.org/officeDocument/2006/relationships" xmlns:p="http://schemas.openxmlformats.org/presentationml/2006/main" type="secHead" preserve="1">
+<p:sldLayout xmlns:a="http://schemas.openxmlformats.org/drawingml/2006/main" xmlns:r="http://schemas.openxmlformats.org/officeDocument/2006/relationships" xmlns:mc="http://schemas.openxmlformats.org/markup-compatibility/2006" xmlns:mv="urn:schemas-microsoft-com:mac:vml" xmlns:p="http://schemas.openxmlformats.org/presentationml/2006/main" mc:Ignorable="mv" mc:PreserveAttributes="mv:*" type="secHead" preserve="1">
   <p:cSld name="Titre de section">
     <p:spTree>
       <p:nvGrpSpPr>
@@ -1062,7 +1070,8 @@
           <a:p>
             <a:fld id="{2C59F9AD-AC7D-47D0-978F-DB0960CE5219}" type="datetimeFigureOut">
               <a:rPr lang="en-US" smtClean="0"/>
-              <a:t>4/8/2016</a:t>
+              <a:pPr/>
+              <a:t>18.04.2016</a:t>
             </a:fld>
             <a:endParaRPr lang="en-US"/>
           </a:p>
@@ -1104,7 +1113,8 @@
           <a:p>
             <a:fld id="{44CA9420-4552-430C-9878-E0B544A9799E}" type="slidenum">
               <a:rPr lang="en-US" smtClean="0"/>
-              <a:t>‹N°›</a:t>
+              <a:pPr/>
+              <a:t>‹Nr.›</a:t>
             </a:fld>
             <a:endParaRPr lang="en-US"/>
           </a:p>
@@ -1113,7 +1123,7 @@
     </p:spTree>
     <p:extLst>
       <p:ext uri="{BB962C8B-B14F-4D97-AF65-F5344CB8AC3E}">
-        <p14:creationId xmlns:p14="http://schemas.microsoft.com/office/powerpoint/2010/main" val="2072317617"/>
+        <p14:creationId xmlns:p14="http://schemas.microsoft.com/office/powerpoint/2010/main" xmlns:p="http://schemas.openxmlformats.org/presentationml/2006/main" xmlns:r="http://schemas.openxmlformats.org/officeDocument/2006/relationships" xmlns:a="http://schemas.openxmlformats.org/drawingml/2006/main" xmlns="" val="2072317617"/>
       </p:ext>
     </p:extLst>
   </p:cSld>
@@ -1124,7 +1134,7 @@
 </file>
 
 <file path=ppt/slideLayouts/slideLayout4.xml><?xml version="1.0" encoding="utf-8"?>
-<p:sldLayout xmlns:a="http://schemas.openxmlformats.org/drawingml/2006/main" xmlns:r="http://schemas.openxmlformats.org/officeDocument/2006/relationships" xmlns:p="http://schemas.openxmlformats.org/presentationml/2006/main" type="twoObj" preserve="1">
+<p:sldLayout xmlns:a="http://schemas.openxmlformats.org/drawingml/2006/main" xmlns:r="http://schemas.openxmlformats.org/officeDocument/2006/relationships" xmlns:mc="http://schemas.openxmlformats.org/markup-compatibility/2006" xmlns:mv="urn:schemas-microsoft-com:mac:vml" xmlns:p="http://schemas.openxmlformats.org/presentationml/2006/main" mc:Ignorable="mv" mc:PreserveAttributes="mv:*" type="twoObj" preserve="1">
   <p:cSld name="Deux contenus">
     <p:spTree>
       <p:nvGrpSpPr>
@@ -1350,7 +1360,8 @@
           <a:p>
             <a:fld id="{2C59F9AD-AC7D-47D0-978F-DB0960CE5219}" type="datetimeFigureOut">
               <a:rPr lang="en-US" smtClean="0"/>
-              <a:t>4/8/2016</a:t>
+              <a:pPr/>
+              <a:t>18.04.2016</a:t>
             </a:fld>
             <a:endParaRPr lang="en-US"/>
           </a:p>
@@ -1392,7 +1403,8 @@
           <a:p>
             <a:fld id="{44CA9420-4552-430C-9878-E0B544A9799E}" type="slidenum">
               <a:rPr lang="en-US" smtClean="0"/>
-              <a:t>‹N°›</a:t>
+              <a:pPr/>
+              <a:t>‹Nr.›</a:t>
             </a:fld>
             <a:endParaRPr lang="en-US"/>
           </a:p>
@@ -1401,7 +1413,7 @@
     </p:spTree>
     <p:extLst>
       <p:ext uri="{BB962C8B-B14F-4D97-AF65-F5344CB8AC3E}">
-        <p14:creationId xmlns:p14="http://schemas.microsoft.com/office/powerpoint/2010/main" val="3430870833"/>
+        <p14:creationId xmlns:p14="http://schemas.microsoft.com/office/powerpoint/2010/main" xmlns:p="http://schemas.openxmlformats.org/presentationml/2006/main" xmlns:r="http://schemas.openxmlformats.org/officeDocument/2006/relationships" xmlns:a="http://schemas.openxmlformats.org/drawingml/2006/main" xmlns="" val="3430870833"/>
       </p:ext>
     </p:extLst>
   </p:cSld>
@@ -1412,7 +1424,7 @@
 </file>
 
 <file path=ppt/slideLayouts/slideLayout5.xml><?xml version="1.0" encoding="utf-8"?>
-<p:sldLayout xmlns:a="http://schemas.openxmlformats.org/drawingml/2006/main" xmlns:r="http://schemas.openxmlformats.org/officeDocument/2006/relationships" xmlns:p="http://schemas.openxmlformats.org/presentationml/2006/main" type="twoTxTwoObj" preserve="1">
+<p:sldLayout xmlns:a="http://schemas.openxmlformats.org/drawingml/2006/main" xmlns:r="http://schemas.openxmlformats.org/officeDocument/2006/relationships" xmlns:mc="http://schemas.openxmlformats.org/markup-compatibility/2006" xmlns:mv="urn:schemas-microsoft-com:mac:vml" xmlns:p="http://schemas.openxmlformats.org/presentationml/2006/main" mc:Ignorable="mv" mc:PreserveAttributes="mv:*" type="twoTxTwoObj" preserve="1">
   <p:cSld name="Comparaison">
     <p:spTree>
       <p:nvGrpSpPr>
@@ -1772,7 +1784,8 @@
           <a:p>
             <a:fld id="{2C59F9AD-AC7D-47D0-978F-DB0960CE5219}" type="datetimeFigureOut">
               <a:rPr lang="en-US" smtClean="0"/>
-              <a:t>4/8/2016</a:t>
+              <a:pPr/>
+              <a:t>18.04.2016</a:t>
             </a:fld>
             <a:endParaRPr lang="en-US"/>
           </a:p>
@@ -1814,7 +1827,8 @@
           <a:p>
             <a:fld id="{44CA9420-4552-430C-9878-E0B544A9799E}" type="slidenum">
               <a:rPr lang="en-US" smtClean="0"/>
-              <a:t>‹N°›</a:t>
+              <a:pPr/>
+              <a:t>‹Nr.›</a:t>
             </a:fld>
             <a:endParaRPr lang="en-US"/>
           </a:p>
@@ -1823,7 +1837,7 @@
     </p:spTree>
     <p:extLst>
       <p:ext uri="{BB962C8B-B14F-4D97-AF65-F5344CB8AC3E}">
-        <p14:creationId xmlns:p14="http://schemas.microsoft.com/office/powerpoint/2010/main" val="246921264"/>
+        <p14:creationId xmlns:p14="http://schemas.microsoft.com/office/powerpoint/2010/main" xmlns:p="http://schemas.openxmlformats.org/presentationml/2006/main" xmlns:r="http://schemas.openxmlformats.org/officeDocument/2006/relationships" xmlns:a="http://schemas.openxmlformats.org/drawingml/2006/main" xmlns="" val="246921264"/>
       </p:ext>
     </p:extLst>
   </p:cSld>
@@ -1834,7 +1848,7 @@
 </file>
 
 <file path=ppt/slideLayouts/slideLayout6.xml><?xml version="1.0" encoding="utf-8"?>
-<p:sldLayout xmlns:a="http://schemas.openxmlformats.org/drawingml/2006/main" xmlns:r="http://schemas.openxmlformats.org/officeDocument/2006/relationships" xmlns:p="http://schemas.openxmlformats.org/presentationml/2006/main" type="titleOnly" preserve="1">
+<p:sldLayout xmlns:a="http://schemas.openxmlformats.org/drawingml/2006/main" xmlns:r="http://schemas.openxmlformats.org/officeDocument/2006/relationships" xmlns:mc="http://schemas.openxmlformats.org/markup-compatibility/2006" xmlns:mv="urn:schemas-microsoft-com:mac:vml" xmlns:p="http://schemas.openxmlformats.org/presentationml/2006/main" mc:Ignorable="mv" mc:PreserveAttributes="mv:*" type="titleOnly" preserve="1">
   <p:cSld name="Titre seul">
     <p:spTree>
       <p:nvGrpSpPr>
@@ -1890,7 +1904,8 @@
           <a:p>
             <a:fld id="{2C59F9AD-AC7D-47D0-978F-DB0960CE5219}" type="datetimeFigureOut">
               <a:rPr lang="en-US" smtClean="0"/>
-              <a:t>4/8/2016</a:t>
+              <a:pPr/>
+              <a:t>18.04.2016</a:t>
             </a:fld>
             <a:endParaRPr lang="en-US"/>
           </a:p>
@@ -1932,7 +1947,8 @@
           <a:p>
             <a:fld id="{44CA9420-4552-430C-9878-E0B544A9799E}" type="slidenum">
               <a:rPr lang="en-US" smtClean="0"/>
-              <a:t>‹N°›</a:t>
+              <a:pPr/>
+              <a:t>‹Nr.›</a:t>
             </a:fld>
             <a:endParaRPr lang="en-US"/>
           </a:p>
@@ -1941,7 +1957,7 @@
     </p:spTree>
     <p:extLst>
       <p:ext uri="{BB962C8B-B14F-4D97-AF65-F5344CB8AC3E}">
-        <p14:creationId xmlns:p14="http://schemas.microsoft.com/office/powerpoint/2010/main" val="2833871767"/>
+        <p14:creationId xmlns:p14="http://schemas.microsoft.com/office/powerpoint/2010/main" xmlns:p="http://schemas.openxmlformats.org/presentationml/2006/main" xmlns:r="http://schemas.openxmlformats.org/officeDocument/2006/relationships" xmlns:a="http://schemas.openxmlformats.org/drawingml/2006/main" xmlns="" val="2833871767"/>
       </p:ext>
     </p:extLst>
   </p:cSld>
@@ -1952,7 +1968,7 @@
 </file>
 
 <file path=ppt/slideLayouts/slideLayout7.xml><?xml version="1.0" encoding="utf-8"?>
-<p:sldLayout xmlns:a="http://schemas.openxmlformats.org/drawingml/2006/main" xmlns:r="http://schemas.openxmlformats.org/officeDocument/2006/relationships" xmlns:p="http://schemas.openxmlformats.org/presentationml/2006/main" type="blank" preserve="1">
+<p:sldLayout xmlns:a="http://schemas.openxmlformats.org/drawingml/2006/main" xmlns:r="http://schemas.openxmlformats.org/officeDocument/2006/relationships" xmlns:mc="http://schemas.openxmlformats.org/markup-compatibility/2006" xmlns:mv="urn:schemas-microsoft-com:mac:vml" xmlns:p="http://schemas.openxmlformats.org/presentationml/2006/main" mc:Ignorable="mv" mc:PreserveAttributes="mv:*" type="blank" preserve="1">
   <p:cSld name="Vide">
     <p:spTree>
       <p:nvGrpSpPr>
@@ -1985,7 +2001,8 @@
           <a:p>
             <a:fld id="{2C59F9AD-AC7D-47D0-978F-DB0960CE5219}" type="datetimeFigureOut">
               <a:rPr lang="en-US" smtClean="0"/>
-              <a:t>4/8/2016</a:t>
+              <a:pPr/>
+              <a:t>18.04.2016</a:t>
             </a:fld>
             <a:endParaRPr lang="en-US"/>
           </a:p>
@@ -2027,7 +2044,8 @@
           <a:p>
             <a:fld id="{44CA9420-4552-430C-9878-E0B544A9799E}" type="slidenum">
               <a:rPr lang="en-US" smtClean="0"/>
-              <a:t>‹N°›</a:t>
+              <a:pPr/>
+              <a:t>‹Nr.›</a:t>
             </a:fld>
             <a:endParaRPr lang="en-US"/>
           </a:p>
@@ -2036,7 +2054,7 @@
     </p:spTree>
     <p:extLst>
       <p:ext uri="{BB962C8B-B14F-4D97-AF65-F5344CB8AC3E}">
-        <p14:creationId xmlns:p14="http://schemas.microsoft.com/office/powerpoint/2010/main" val="1473096845"/>
+        <p14:creationId xmlns:p14="http://schemas.microsoft.com/office/powerpoint/2010/main" xmlns:p="http://schemas.openxmlformats.org/presentationml/2006/main" xmlns:r="http://schemas.openxmlformats.org/officeDocument/2006/relationships" xmlns:a="http://schemas.openxmlformats.org/drawingml/2006/main" xmlns="" val="1473096845"/>
       </p:ext>
     </p:extLst>
   </p:cSld>
@@ -2047,7 +2065,7 @@
 </file>
 
 <file path=ppt/slideLayouts/slideLayout8.xml><?xml version="1.0" encoding="utf-8"?>
-<p:sldLayout xmlns:a="http://schemas.openxmlformats.org/drawingml/2006/main" xmlns:r="http://schemas.openxmlformats.org/officeDocument/2006/relationships" xmlns:p="http://schemas.openxmlformats.org/presentationml/2006/main" type="objTx" preserve="1">
+<p:sldLayout xmlns:a="http://schemas.openxmlformats.org/drawingml/2006/main" xmlns:r="http://schemas.openxmlformats.org/officeDocument/2006/relationships" xmlns:mc="http://schemas.openxmlformats.org/markup-compatibility/2006" xmlns:mv="urn:schemas-microsoft-com:mac:vml" xmlns:p="http://schemas.openxmlformats.org/presentationml/2006/main" mc:Ignorable="mv" mc:PreserveAttributes="mv:*" type="objTx" preserve="1">
   <p:cSld name="Contenu avec légende">
     <p:spTree>
       <p:nvGrpSpPr>
@@ -2262,7 +2280,8 @@
           <a:p>
             <a:fld id="{2C59F9AD-AC7D-47D0-978F-DB0960CE5219}" type="datetimeFigureOut">
               <a:rPr lang="en-US" smtClean="0"/>
-              <a:t>4/8/2016</a:t>
+              <a:pPr/>
+              <a:t>18.04.2016</a:t>
             </a:fld>
             <a:endParaRPr lang="en-US"/>
           </a:p>
@@ -2304,7 +2323,8 @@
           <a:p>
             <a:fld id="{44CA9420-4552-430C-9878-E0B544A9799E}" type="slidenum">
               <a:rPr lang="en-US" smtClean="0"/>
-              <a:t>‹N°›</a:t>
+              <a:pPr/>
+              <a:t>‹Nr.›</a:t>
             </a:fld>
             <a:endParaRPr lang="en-US"/>
           </a:p>
@@ -2313,7 +2333,7 @@
     </p:spTree>
     <p:extLst>
       <p:ext uri="{BB962C8B-B14F-4D97-AF65-F5344CB8AC3E}">
-        <p14:creationId xmlns:p14="http://schemas.microsoft.com/office/powerpoint/2010/main" val="2930352400"/>
+        <p14:creationId xmlns:p14="http://schemas.microsoft.com/office/powerpoint/2010/main" xmlns:p="http://schemas.openxmlformats.org/presentationml/2006/main" xmlns:r="http://schemas.openxmlformats.org/officeDocument/2006/relationships" xmlns:a="http://schemas.openxmlformats.org/drawingml/2006/main" xmlns="" val="2930352400"/>
       </p:ext>
     </p:extLst>
   </p:cSld>
@@ -2324,7 +2344,7 @@
 </file>
 
 <file path=ppt/slideLayouts/slideLayout9.xml><?xml version="1.0" encoding="utf-8"?>
-<p:sldLayout xmlns:a="http://schemas.openxmlformats.org/drawingml/2006/main" xmlns:r="http://schemas.openxmlformats.org/officeDocument/2006/relationships" xmlns:p="http://schemas.openxmlformats.org/presentationml/2006/main" type="picTx" preserve="1">
+<p:sldLayout xmlns:a="http://schemas.openxmlformats.org/drawingml/2006/main" xmlns:r="http://schemas.openxmlformats.org/officeDocument/2006/relationships" xmlns:mc="http://schemas.openxmlformats.org/markup-compatibility/2006" xmlns:mv="urn:schemas-microsoft-com:mac:vml" xmlns:p="http://schemas.openxmlformats.org/presentationml/2006/main" mc:Ignorable="mv" mc:PreserveAttributes="mv:*" type="picTx" preserve="1">
   <p:cSld name="Image avec légende">
     <p:spTree>
       <p:nvGrpSpPr>
@@ -2515,7 +2535,8 @@
           <a:p>
             <a:fld id="{2C59F9AD-AC7D-47D0-978F-DB0960CE5219}" type="datetimeFigureOut">
               <a:rPr lang="en-US" smtClean="0"/>
-              <a:t>4/8/2016</a:t>
+              <a:pPr/>
+              <a:t>18.04.2016</a:t>
             </a:fld>
             <a:endParaRPr lang="en-US"/>
           </a:p>
@@ -2557,7 +2578,8 @@
           <a:p>
             <a:fld id="{44CA9420-4552-430C-9878-E0B544A9799E}" type="slidenum">
               <a:rPr lang="en-US" smtClean="0"/>
-              <a:t>‹N°›</a:t>
+              <a:pPr/>
+              <a:t>‹Nr.›</a:t>
             </a:fld>
             <a:endParaRPr lang="en-US"/>
           </a:p>
@@ -2566,7 +2588,7 @@
     </p:spTree>
     <p:extLst>
       <p:ext uri="{BB962C8B-B14F-4D97-AF65-F5344CB8AC3E}">
-        <p14:creationId xmlns:p14="http://schemas.microsoft.com/office/powerpoint/2010/main" val="1228895368"/>
+        <p14:creationId xmlns:p14="http://schemas.microsoft.com/office/powerpoint/2010/main" xmlns:p="http://schemas.openxmlformats.org/presentationml/2006/main" xmlns:r="http://schemas.openxmlformats.org/officeDocument/2006/relationships" xmlns:a="http://schemas.openxmlformats.org/drawingml/2006/main" xmlns="" val="1228895368"/>
       </p:ext>
     </p:extLst>
   </p:cSld>
@@ -2577,7 +2599,7 @@
 </file>
 
 <file path=ppt/slideMasters/slideMaster1.xml><?xml version="1.0" encoding="utf-8"?>
-<p:sldMaster xmlns:a="http://schemas.openxmlformats.org/drawingml/2006/main" xmlns:r="http://schemas.openxmlformats.org/officeDocument/2006/relationships" xmlns:p="http://schemas.openxmlformats.org/presentationml/2006/main">
+<p:sldMaster xmlns:a="http://schemas.openxmlformats.org/drawingml/2006/main" xmlns:r="http://schemas.openxmlformats.org/officeDocument/2006/relationships" xmlns:mc="http://schemas.openxmlformats.org/markup-compatibility/2006" xmlns:mv="urn:schemas-microsoft-com:mac:vml" xmlns:p="http://schemas.openxmlformats.org/presentationml/2006/main" mc:Ignorable="mv" mc:PreserveAttributes="mv:*">
   <p:cSld>
     <p:bg>
       <p:bgRef idx="1001">
@@ -2728,7 +2750,8 @@
           <a:p>
             <a:fld id="{2C59F9AD-AC7D-47D0-978F-DB0960CE5219}" type="datetimeFigureOut">
               <a:rPr lang="en-US" smtClean="0"/>
-              <a:t>4/8/2016</a:t>
+              <a:pPr/>
+              <a:t>18.04.2016</a:t>
             </a:fld>
             <a:endParaRPr lang="en-US"/>
           </a:p>
@@ -2806,7 +2829,8 @@
           <a:p>
             <a:fld id="{44CA9420-4552-430C-9878-E0B544A9799E}" type="slidenum">
               <a:rPr lang="en-US" smtClean="0"/>
-              <a:t>‹N°›</a:t>
+              <a:pPr/>
+              <a:t>‹Nr.›</a:t>
             </a:fld>
             <a:endParaRPr lang="en-US"/>
           </a:p>
@@ -2815,7 +2839,7 @@
     </p:spTree>
     <p:extLst>
       <p:ext uri="{BB962C8B-B14F-4D97-AF65-F5344CB8AC3E}">
-        <p14:creationId xmlns:p14="http://schemas.microsoft.com/office/powerpoint/2010/main" val="675265094"/>
+        <p14:creationId xmlns:p14="http://schemas.microsoft.com/office/powerpoint/2010/main" xmlns:p="http://schemas.openxmlformats.org/presentationml/2006/main" xmlns:r="http://schemas.openxmlformats.org/officeDocument/2006/relationships" xmlns:a="http://schemas.openxmlformats.org/drawingml/2006/main" xmlns="" val="675265094"/>
       </p:ext>
     </p:extLst>
   </p:cSld>
@@ -3087,7 +3111,7 @@
 </file>
 
 <file path=ppt/slides/slide1.xml><?xml version="1.0" encoding="utf-8"?>
-<p:sld xmlns:a="http://schemas.openxmlformats.org/drawingml/2006/main" xmlns:r="http://schemas.openxmlformats.org/officeDocument/2006/relationships" xmlns:p="http://schemas.openxmlformats.org/presentationml/2006/main">
+<p:sld xmlns:a="http://schemas.openxmlformats.org/drawingml/2006/main" xmlns:r="http://schemas.openxmlformats.org/officeDocument/2006/relationships" xmlns:mc="http://schemas.openxmlformats.org/markup-compatibility/2006" xmlns:mv="urn:schemas-microsoft-com:mac:vml" xmlns:p="http://schemas.openxmlformats.org/presentationml/2006/main" mc:Ignorable="mv" mc:PreserveAttributes="mv:*">
   <p:cSld>
     <p:spTree>
       <p:nvGrpSpPr>
@@ -3263,11 +3287,7 @@
           <a:p>
             <a:r>
               <a:rPr lang="fr-FR" dirty="0" smtClean="0"/>
-              <a:t>v-rethink3 </a:t>
-            </a:r>
-            <a:r>
-              <a:rPr lang="fr-FR" dirty="0" smtClean="0"/>
-              <a:t>161.106.2.20</a:t>
+              <a:t>v-rethink3 161.106.2.20</a:t>
             </a:r>
             <a:endParaRPr lang="en-US" dirty="0"/>
           </a:p>
@@ -3708,7 +3728,7 @@
             <a:blip r:embed="rId2">
               <a:extLst>
                 <a:ext uri="{28A0092B-C50C-407E-A947-70E740481C1C}">
-                  <a14:useLocalDpi xmlns:a14="http://schemas.microsoft.com/office/drawing/2010/main" val="0"/>
+                  <a14:useLocalDpi xmlns:a14="http://schemas.microsoft.com/office/drawing/2010/main" xmlns:p="http://schemas.openxmlformats.org/presentationml/2006/main" xmlns:r="http://schemas.openxmlformats.org/officeDocument/2006/relationships" xmlns:a="http://schemas.openxmlformats.org/drawingml/2006/main" xmlns="" val="0"/>
                 </a:ext>
               </a:extLst>
             </a:blip>
@@ -3728,7 +3748,7 @@
             <a:noFill/>
             <a:extLst>
               <a:ext uri="{909E8E84-426E-40DD-AFC4-6F175D3DCCD1}">
-                <a14:hiddenFill xmlns:a14="http://schemas.microsoft.com/office/drawing/2010/main">
+                <a14:hiddenFill xmlns:a14="http://schemas.microsoft.com/office/drawing/2010/main" xmlns:p="http://schemas.openxmlformats.org/presentationml/2006/main" xmlns:r="http://schemas.openxmlformats.org/officeDocument/2006/relationships" xmlns:a="http://schemas.openxmlformats.org/drawingml/2006/main" xmlns="">
                   <a:solidFill>
                     <a:srgbClr val="FFFFFF"/>
                   </a:solidFill>
@@ -3749,7 +3769,7 @@
             <a:blip r:embed="rId2">
               <a:extLst>
                 <a:ext uri="{28A0092B-C50C-407E-A947-70E740481C1C}">
-                  <a14:useLocalDpi xmlns:a14="http://schemas.microsoft.com/office/drawing/2010/main" val="0"/>
+                  <a14:useLocalDpi xmlns:a14="http://schemas.microsoft.com/office/drawing/2010/main" xmlns:p="http://schemas.openxmlformats.org/presentationml/2006/main" xmlns:r="http://schemas.openxmlformats.org/officeDocument/2006/relationships" xmlns:a="http://schemas.openxmlformats.org/drawingml/2006/main" xmlns="" val="0"/>
                 </a:ext>
               </a:extLst>
             </a:blip>
@@ -3769,7 +3789,7 @@
             <a:noFill/>
             <a:extLst>
               <a:ext uri="{909E8E84-426E-40DD-AFC4-6F175D3DCCD1}">
-                <a14:hiddenFill xmlns:a14="http://schemas.microsoft.com/office/drawing/2010/main">
+                <a14:hiddenFill xmlns:a14="http://schemas.microsoft.com/office/drawing/2010/main" xmlns:p="http://schemas.openxmlformats.org/presentationml/2006/main" xmlns:r="http://schemas.openxmlformats.org/officeDocument/2006/relationships" xmlns:a="http://schemas.openxmlformats.org/drawingml/2006/main" xmlns="">
                   <a:solidFill>
                     <a:srgbClr val="FFFFFF"/>
                   </a:solidFill>
@@ -3790,7 +3810,7 @@
             <a:blip r:embed="rId2">
               <a:extLst>
                 <a:ext uri="{28A0092B-C50C-407E-A947-70E740481C1C}">
-                  <a14:useLocalDpi xmlns:a14="http://schemas.microsoft.com/office/drawing/2010/main" val="0"/>
+                  <a14:useLocalDpi xmlns:a14="http://schemas.microsoft.com/office/drawing/2010/main" xmlns:p="http://schemas.openxmlformats.org/presentationml/2006/main" xmlns:r="http://schemas.openxmlformats.org/officeDocument/2006/relationships" xmlns:a="http://schemas.openxmlformats.org/drawingml/2006/main" xmlns="" val="0"/>
                 </a:ext>
               </a:extLst>
             </a:blip>
@@ -3810,7 +3830,7 @@
             <a:noFill/>
             <a:extLst>
               <a:ext uri="{909E8E84-426E-40DD-AFC4-6F175D3DCCD1}">
-                <a14:hiddenFill xmlns:a14="http://schemas.microsoft.com/office/drawing/2010/main">
+                <a14:hiddenFill xmlns:a14="http://schemas.microsoft.com/office/drawing/2010/main" xmlns:p="http://schemas.openxmlformats.org/presentationml/2006/main" xmlns:r="http://schemas.openxmlformats.org/officeDocument/2006/relationships" xmlns:a="http://schemas.openxmlformats.org/drawingml/2006/main" xmlns="">
                   <a:solidFill>
                     <a:srgbClr val="FFFFFF"/>
                   </a:solidFill>
@@ -3831,7 +3851,7 @@
             <a:blip r:embed="rId3">
               <a:extLst>
                 <a:ext uri="{28A0092B-C50C-407E-A947-70E740481C1C}">
-                  <a14:useLocalDpi xmlns:a14="http://schemas.microsoft.com/office/drawing/2010/main" val="0"/>
+                  <a14:useLocalDpi xmlns:a14="http://schemas.microsoft.com/office/drawing/2010/main" xmlns:p="http://schemas.openxmlformats.org/presentationml/2006/main" xmlns:r="http://schemas.openxmlformats.org/officeDocument/2006/relationships" xmlns:a="http://schemas.openxmlformats.org/drawingml/2006/main" xmlns="" val="0"/>
                 </a:ext>
               </a:extLst>
             </a:blip>
@@ -3851,7 +3871,7 @@
             <a:noFill/>
             <a:extLst>
               <a:ext uri="{909E8E84-426E-40DD-AFC4-6F175D3DCCD1}">
-                <a14:hiddenFill xmlns:a14="http://schemas.microsoft.com/office/drawing/2010/main">
+                <a14:hiddenFill xmlns:a14="http://schemas.microsoft.com/office/drawing/2010/main" xmlns:p="http://schemas.openxmlformats.org/presentationml/2006/main" xmlns:r="http://schemas.openxmlformats.org/officeDocument/2006/relationships" xmlns:a="http://schemas.openxmlformats.org/drawingml/2006/main" xmlns="">
                   <a:solidFill>
                     <a:srgbClr val="FFFFFF"/>
                   </a:solidFill>
@@ -4045,7 +4065,7 @@
             <a:blip r:embed="rId2">
               <a:extLst>
                 <a:ext uri="{28A0092B-C50C-407E-A947-70E740481C1C}">
-                  <a14:useLocalDpi xmlns:a14="http://schemas.microsoft.com/office/drawing/2010/main" val="0"/>
+                  <a14:useLocalDpi xmlns:a14="http://schemas.microsoft.com/office/drawing/2010/main" xmlns:p="http://schemas.openxmlformats.org/presentationml/2006/main" xmlns:r="http://schemas.openxmlformats.org/officeDocument/2006/relationships" xmlns:a="http://schemas.openxmlformats.org/drawingml/2006/main" xmlns="" val="0"/>
                 </a:ext>
               </a:extLst>
             </a:blip>
@@ -4065,7 +4085,7 @@
             <a:noFill/>
             <a:extLst>
               <a:ext uri="{909E8E84-426E-40DD-AFC4-6F175D3DCCD1}">
-                <a14:hiddenFill xmlns:a14="http://schemas.microsoft.com/office/drawing/2010/main">
+                <a14:hiddenFill xmlns:a14="http://schemas.microsoft.com/office/drawing/2010/main" xmlns:p="http://schemas.openxmlformats.org/presentationml/2006/main" xmlns:r="http://schemas.openxmlformats.org/officeDocument/2006/relationships" xmlns:a="http://schemas.openxmlformats.org/drawingml/2006/main" xmlns="">
                   <a:solidFill>
                     <a:srgbClr val="FFFFFF"/>
                   </a:solidFill>
@@ -4086,7 +4106,7 @@
             <a:blip r:embed="rId2">
               <a:extLst>
                 <a:ext uri="{28A0092B-C50C-407E-A947-70E740481C1C}">
-                  <a14:useLocalDpi xmlns:a14="http://schemas.microsoft.com/office/drawing/2010/main" val="0"/>
+                  <a14:useLocalDpi xmlns:a14="http://schemas.microsoft.com/office/drawing/2010/main" xmlns:p="http://schemas.openxmlformats.org/presentationml/2006/main" xmlns:r="http://schemas.openxmlformats.org/officeDocument/2006/relationships" xmlns:a="http://schemas.openxmlformats.org/drawingml/2006/main" xmlns="" val="0"/>
                 </a:ext>
               </a:extLst>
             </a:blip>
@@ -4106,7 +4126,7 @@
             <a:noFill/>
             <a:extLst>
               <a:ext uri="{909E8E84-426E-40DD-AFC4-6F175D3DCCD1}">
-                <a14:hiddenFill xmlns:a14="http://schemas.microsoft.com/office/drawing/2010/main">
+                <a14:hiddenFill xmlns:a14="http://schemas.microsoft.com/office/drawing/2010/main" xmlns:p="http://schemas.openxmlformats.org/presentationml/2006/main" xmlns:r="http://schemas.openxmlformats.org/officeDocument/2006/relationships" xmlns:a="http://schemas.openxmlformats.org/drawingml/2006/main" xmlns="">
                   <a:solidFill>
                     <a:srgbClr val="FFFFFF"/>
                   </a:solidFill>
@@ -4127,7 +4147,7 @@
             <a:blip r:embed="rId2">
               <a:extLst>
                 <a:ext uri="{28A0092B-C50C-407E-A947-70E740481C1C}">
-                  <a14:useLocalDpi xmlns:a14="http://schemas.microsoft.com/office/drawing/2010/main" val="0"/>
+                  <a14:useLocalDpi xmlns:a14="http://schemas.microsoft.com/office/drawing/2010/main" xmlns:p="http://schemas.openxmlformats.org/presentationml/2006/main" xmlns:r="http://schemas.openxmlformats.org/officeDocument/2006/relationships" xmlns:a="http://schemas.openxmlformats.org/drawingml/2006/main" xmlns="" val="0"/>
                 </a:ext>
               </a:extLst>
             </a:blip>
@@ -4147,7 +4167,7 @@
             <a:noFill/>
             <a:extLst>
               <a:ext uri="{909E8E84-426E-40DD-AFC4-6F175D3DCCD1}">
-                <a14:hiddenFill xmlns:a14="http://schemas.microsoft.com/office/drawing/2010/main">
+                <a14:hiddenFill xmlns:a14="http://schemas.microsoft.com/office/drawing/2010/main" xmlns:p="http://schemas.openxmlformats.org/presentationml/2006/main" xmlns:r="http://schemas.openxmlformats.org/officeDocument/2006/relationships" xmlns:a="http://schemas.openxmlformats.org/drawingml/2006/main" xmlns="">
                   <a:solidFill>
                     <a:srgbClr val="FFFFFF"/>
                   </a:solidFill>
@@ -4168,7 +4188,7 @@
             <a:blip r:embed="rId3">
               <a:extLst>
                 <a:ext uri="{28A0092B-C50C-407E-A947-70E740481C1C}">
-                  <a14:useLocalDpi xmlns:a14="http://schemas.microsoft.com/office/drawing/2010/main" val="0"/>
+                  <a14:useLocalDpi xmlns:a14="http://schemas.microsoft.com/office/drawing/2010/main" xmlns:p="http://schemas.openxmlformats.org/presentationml/2006/main" xmlns:r="http://schemas.openxmlformats.org/officeDocument/2006/relationships" xmlns:a="http://schemas.openxmlformats.org/drawingml/2006/main" xmlns="" val="0"/>
                 </a:ext>
               </a:extLst>
             </a:blip>
@@ -4188,7 +4208,7 @@
             <a:noFill/>
             <a:extLst>
               <a:ext uri="{909E8E84-426E-40DD-AFC4-6F175D3DCCD1}">
-                <a14:hiddenFill xmlns:a14="http://schemas.microsoft.com/office/drawing/2010/main">
+                <a14:hiddenFill xmlns:a14="http://schemas.microsoft.com/office/drawing/2010/main" xmlns:p="http://schemas.openxmlformats.org/presentationml/2006/main" xmlns:r="http://schemas.openxmlformats.org/officeDocument/2006/relationships" xmlns:a="http://schemas.openxmlformats.org/drawingml/2006/main" xmlns="">
                   <a:solidFill>
                     <a:srgbClr val="FFFFFF"/>
                   </a:solidFill>
@@ -4384,7 +4404,7 @@
             <a:blip r:embed="rId2">
               <a:extLst>
                 <a:ext uri="{28A0092B-C50C-407E-A947-70E740481C1C}">
-                  <a14:useLocalDpi xmlns:a14="http://schemas.microsoft.com/office/drawing/2010/main" val="0"/>
+                  <a14:useLocalDpi xmlns:a14="http://schemas.microsoft.com/office/drawing/2010/main" xmlns:p="http://schemas.openxmlformats.org/presentationml/2006/main" xmlns:r="http://schemas.openxmlformats.org/officeDocument/2006/relationships" xmlns:a="http://schemas.openxmlformats.org/drawingml/2006/main" xmlns="" val="0"/>
                 </a:ext>
               </a:extLst>
             </a:blip>
@@ -4404,7 +4424,7 @@
             <a:noFill/>
             <a:extLst>
               <a:ext uri="{909E8E84-426E-40DD-AFC4-6F175D3DCCD1}">
-                <a14:hiddenFill xmlns:a14="http://schemas.microsoft.com/office/drawing/2010/main">
+                <a14:hiddenFill xmlns:a14="http://schemas.microsoft.com/office/drawing/2010/main" xmlns:p="http://schemas.openxmlformats.org/presentationml/2006/main" xmlns:r="http://schemas.openxmlformats.org/officeDocument/2006/relationships" xmlns:a="http://schemas.openxmlformats.org/drawingml/2006/main" xmlns="">
                   <a:solidFill>
                     <a:srgbClr val="FFFFFF"/>
                   </a:solidFill>
@@ -4425,7 +4445,7 @@
             <a:blip r:embed="rId2">
               <a:extLst>
                 <a:ext uri="{28A0092B-C50C-407E-A947-70E740481C1C}">
-                  <a14:useLocalDpi xmlns:a14="http://schemas.microsoft.com/office/drawing/2010/main" val="0"/>
+                  <a14:useLocalDpi xmlns:a14="http://schemas.microsoft.com/office/drawing/2010/main" xmlns:p="http://schemas.openxmlformats.org/presentationml/2006/main" xmlns:r="http://schemas.openxmlformats.org/officeDocument/2006/relationships" xmlns:a="http://schemas.openxmlformats.org/drawingml/2006/main" xmlns="" val="0"/>
                 </a:ext>
               </a:extLst>
             </a:blip>
@@ -4445,7 +4465,7 @@
             <a:noFill/>
             <a:extLst>
               <a:ext uri="{909E8E84-426E-40DD-AFC4-6F175D3DCCD1}">
-                <a14:hiddenFill xmlns:a14="http://schemas.microsoft.com/office/drawing/2010/main">
+                <a14:hiddenFill xmlns:a14="http://schemas.microsoft.com/office/drawing/2010/main" xmlns:p="http://schemas.openxmlformats.org/presentationml/2006/main" xmlns:r="http://schemas.openxmlformats.org/officeDocument/2006/relationships" xmlns:a="http://schemas.openxmlformats.org/drawingml/2006/main" xmlns="">
                   <a:solidFill>
                     <a:srgbClr val="FFFFFF"/>
                   </a:solidFill>
@@ -4466,7 +4486,7 @@
             <a:blip r:embed="rId2">
               <a:extLst>
                 <a:ext uri="{28A0092B-C50C-407E-A947-70E740481C1C}">
-                  <a14:useLocalDpi xmlns:a14="http://schemas.microsoft.com/office/drawing/2010/main" val="0"/>
+                  <a14:useLocalDpi xmlns:a14="http://schemas.microsoft.com/office/drawing/2010/main" xmlns:p="http://schemas.openxmlformats.org/presentationml/2006/main" xmlns:r="http://schemas.openxmlformats.org/officeDocument/2006/relationships" xmlns:a="http://schemas.openxmlformats.org/drawingml/2006/main" xmlns="" val="0"/>
                 </a:ext>
               </a:extLst>
             </a:blip>
@@ -4486,7 +4506,7 @@
             <a:noFill/>
             <a:extLst>
               <a:ext uri="{909E8E84-426E-40DD-AFC4-6F175D3DCCD1}">
-                <a14:hiddenFill xmlns:a14="http://schemas.microsoft.com/office/drawing/2010/main">
+                <a14:hiddenFill xmlns:a14="http://schemas.microsoft.com/office/drawing/2010/main" xmlns:p="http://schemas.openxmlformats.org/presentationml/2006/main" xmlns:r="http://schemas.openxmlformats.org/officeDocument/2006/relationships" xmlns:a="http://schemas.openxmlformats.org/drawingml/2006/main" xmlns="">
                   <a:solidFill>
                     <a:srgbClr val="FFFFFF"/>
                   </a:solidFill>
@@ -4507,7 +4527,7 @@
             <a:blip r:embed="rId3">
               <a:extLst>
                 <a:ext uri="{28A0092B-C50C-407E-A947-70E740481C1C}">
-                  <a14:useLocalDpi xmlns:a14="http://schemas.microsoft.com/office/drawing/2010/main" val="0"/>
+                  <a14:useLocalDpi xmlns:a14="http://schemas.microsoft.com/office/drawing/2010/main" xmlns:p="http://schemas.openxmlformats.org/presentationml/2006/main" xmlns:r="http://schemas.openxmlformats.org/officeDocument/2006/relationships" xmlns:a="http://schemas.openxmlformats.org/drawingml/2006/main" xmlns="" val="0"/>
                 </a:ext>
               </a:extLst>
             </a:blip>
@@ -4527,7 +4547,7 @@
             <a:noFill/>
             <a:extLst>
               <a:ext uri="{909E8E84-426E-40DD-AFC4-6F175D3DCCD1}">
-                <a14:hiddenFill xmlns:a14="http://schemas.microsoft.com/office/drawing/2010/main">
+                <a14:hiddenFill xmlns:a14="http://schemas.microsoft.com/office/drawing/2010/main" xmlns:p="http://schemas.openxmlformats.org/presentationml/2006/main" xmlns:r="http://schemas.openxmlformats.org/officeDocument/2006/relationships" xmlns:a="http://schemas.openxmlformats.org/drawingml/2006/main" xmlns="">
                   <a:solidFill>
                     <a:srgbClr val="FFFFFF"/>
                   </a:solidFill>
@@ -4832,7 +4852,7 @@
     </p:spTree>
     <p:extLst>
       <p:ext uri="{BB962C8B-B14F-4D97-AF65-F5344CB8AC3E}">
-        <p14:creationId xmlns:p14="http://schemas.microsoft.com/office/powerpoint/2010/main" val="2590447093"/>
+        <p14:creationId xmlns:p14="http://schemas.microsoft.com/office/powerpoint/2010/main" xmlns:p="http://schemas.openxmlformats.org/presentationml/2006/main" xmlns:r="http://schemas.openxmlformats.org/officeDocument/2006/relationships" xmlns:a="http://schemas.openxmlformats.org/drawingml/2006/main" xmlns="" val="2590447093"/>
       </p:ext>
     </p:extLst>
   </p:cSld>
@@ -4843,7 +4863,7 @@
 </file>
 
 <file path=ppt/slides/slide2.xml><?xml version="1.0" encoding="utf-8"?>
-<p:sld xmlns:a="http://schemas.openxmlformats.org/drawingml/2006/main" xmlns:r="http://schemas.openxmlformats.org/officeDocument/2006/relationships" xmlns:p="http://schemas.openxmlformats.org/presentationml/2006/main">
+<p:sld xmlns:a="http://schemas.openxmlformats.org/drawingml/2006/main" xmlns:r="http://schemas.openxmlformats.org/officeDocument/2006/relationships" xmlns:mc="http://schemas.openxmlformats.org/markup-compatibility/2006" xmlns:mv="urn:schemas-microsoft-com:mac:vml" xmlns:p="http://schemas.openxmlformats.org/presentationml/2006/main" mc:Ignorable="mv" mc:PreserveAttributes="mv:*">
   <p:cSld>
     <p:spTree>
       <p:nvGrpSpPr>
@@ -4909,7 +4929,7 @@
           <a:blip r:embed="rId2">
             <a:extLst>
               <a:ext uri="{28A0092B-C50C-407E-A947-70E740481C1C}">
-                <a14:useLocalDpi xmlns:a14="http://schemas.microsoft.com/office/drawing/2010/main" val="0"/>
+                <a14:useLocalDpi xmlns:a14="http://schemas.microsoft.com/office/drawing/2010/main" xmlns:p="http://schemas.openxmlformats.org/presentationml/2006/main" xmlns:r="http://schemas.openxmlformats.org/officeDocument/2006/relationships" xmlns:a="http://schemas.openxmlformats.org/drawingml/2006/main" xmlns="" val="0"/>
               </a:ext>
             </a:extLst>
           </a:blip>
@@ -4933,14 +4953,14 @@
           <a:effectLst/>
           <a:extLst>
             <a:ext uri="{909E8E84-426E-40DD-AFC4-6F175D3DCCD1}">
-              <a14:hiddenFill xmlns:a14="http://schemas.microsoft.com/office/drawing/2010/main">
+              <a14:hiddenFill xmlns:a14="http://schemas.microsoft.com/office/drawing/2010/main" xmlns:p="http://schemas.openxmlformats.org/presentationml/2006/main" xmlns:r="http://schemas.openxmlformats.org/officeDocument/2006/relationships" xmlns:a="http://schemas.openxmlformats.org/drawingml/2006/main" xmlns="">
                 <a:solidFill>
                   <a:schemeClr val="accent1"/>
                 </a:solidFill>
               </a14:hiddenFill>
             </a:ext>
             <a:ext uri="{91240B29-F687-4F45-9708-019B960494DF}">
-              <a14:hiddenLine xmlns:a14="http://schemas.microsoft.com/office/drawing/2010/main" w="9525">
+              <a14:hiddenLine xmlns:a14="http://schemas.microsoft.com/office/drawing/2010/main" xmlns:p="http://schemas.openxmlformats.org/presentationml/2006/main" xmlns:r="http://schemas.openxmlformats.org/officeDocument/2006/relationships" xmlns:a="http://schemas.openxmlformats.org/drawingml/2006/main" xmlns="" w="9525">
                 <a:solidFill>
                   <a:schemeClr val="tx1"/>
                 </a:solidFill>
@@ -4950,7 +4970,7 @@
               </a14:hiddenLine>
             </a:ext>
             <a:ext uri="{AF507438-7753-43E0-B8FC-AC1667EBCBE1}">
-              <a14:hiddenEffects xmlns:a14="http://schemas.microsoft.com/office/drawing/2010/main">
+              <a14:hiddenEffects xmlns:a14="http://schemas.microsoft.com/office/drawing/2010/main" xmlns:p="http://schemas.openxmlformats.org/presentationml/2006/main" xmlns:r="http://schemas.openxmlformats.org/officeDocument/2006/relationships" xmlns:a="http://schemas.openxmlformats.org/drawingml/2006/main" xmlns="">
                 <a:effectLst>
                   <a:outerShdw dist="35921" dir="2700000" algn="ctr" rotWithShape="0">
                     <a:schemeClr val="bg2"/>
@@ -4964,7 +4984,7 @@
     </p:spTree>
     <p:extLst>
       <p:ext uri="{BB962C8B-B14F-4D97-AF65-F5344CB8AC3E}">
-        <p14:creationId xmlns:p14="http://schemas.microsoft.com/office/powerpoint/2010/main" val="1423342936"/>
+        <p14:creationId xmlns:p14="http://schemas.microsoft.com/office/powerpoint/2010/main" xmlns:p="http://schemas.openxmlformats.org/presentationml/2006/main" xmlns:r="http://schemas.openxmlformats.org/officeDocument/2006/relationships" xmlns:a="http://schemas.openxmlformats.org/drawingml/2006/main" xmlns="" val="1423342936"/>
       </p:ext>
     </p:extLst>
   </p:cSld>
@@ -4975,7 +4995,7 @@
 </file>
 
 <file path=ppt/slides/slide3.xml><?xml version="1.0" encoding="utf-8"?>
-<p:sld xmlns:a="http://schemas.openxmlformats.org/drawingml/2006/main" xmlns:r="http://schemas.openxmlformats.org/officeDocument/2006/relationships" xmlns:p="http://schemas.openxmlformats.org/presentationml/2006/main">
+<p:sld xmlns:a="http://schemas.openxmlformats.org/drawingml/2006/main" xmlns:r="http://schemas.openxmlformats.org/officeDocument/2006/relationships" xmlns:mc="http://schemas.openxmlformats.org/markup-compatibility/2006" xmlns:mv="urn:schemas-microsoft-com:mac:vml" xmlns:p="http://schemas.openxmlformats.org/presentationml/2006/main" mc:Ignorable="mv" mc:PreserveAttributes="mv:*">
   <p:cSld>
     <p:spTree>
       <p:nvGrpSpPr>
@@ -5251,7 +5271,7 @@
           <a:blip r:embed="rId3">
             <a:extLst>
               <a:ext uri="{28A0092B-C50C-407E-A947-70E740481C1C}">
-                <a14:useLocalDpi xmlns:a14="http://schemas.microsoft.com/office/drawing/2010/main" val="0"/>
+                <a14:useLocalDpi xmlns:a14="http://schemas.microsoft.com/office/drawing/2010/main" xmlns:p="http://schemas.openxmlformats.org/presentationml/2006/main" xmlns:r="http://schemas.openxmlformats.org/officeDocument/2006/relationships" xmlns:a="http://schemas.openxmlformats.org/drawingml/2006/main" xmlns="" val="0"/>
               </a:ext>
             </a:extLst>
           </a:blip>
@@ -5271,7 +5291,7 @@
           <a:noFill/>
           <a:extLst>
             <a:ext uri="{909E8E84-426E-40DD-AFC4-6F175D3DCCD1}">
-              <a14:hiddenFill xmlns:a14="http://schemas.microsoft.com/office/drawing/2010/main">
+              <a14:hiddenFill xmlns:a14="http://schemas.microsoft.com/office/drawing/2010/main" xmlns:p="http://schemas.openxmlformats.org/presentationml/2006/main" xmlns:r="http://schemas.openxmlformats.org/officeDocument/2006/relationships" xmlns:a="http://schemas.openxmlformats.org/drawingml/2006/main" xmlns="">
                 <a:solidFill>
                   <a:srgbClr val="FFFFFF"/>
                 </a:solidFill>
@@ -5292,7 +5312,7 @@
           <a:blip r:embed="rId4">
             <a:extLst>
               <a:ext uri="{28A0092B-C50C-407E-A947-70E740481C1C}">
-                <a14:useLocalDpi xmlns:a14="http://schemas.microsoft.com/office/drawing/2010/main" val="0"/>
+                <a14:useLocalDpi xmlns:a14="http://schemas.microsoft.com/office/drawing/2010/main" xmlns:p="http://schemas.openxmlformats.org/presentationml/2006/main" xmlns:r="http://schemas.openxmlformats.org/officeDocument/2006/relationships" xmlns:a="http://schemas.openxmlformats.org/drawingml/2006/main" xmlns="" val="0"/>
               </a:ext>
             </a:extLst>
           </a:blip>
@@ -5312,7 +5332,7 @@
           <a:noFill/>
           <a:extLst>
             <a:ext uri="{909E8E84-426E-40DD-AFC4-6F175D3DCCD1}">
-              <a14:hiddenFill xmlns:a14="http://schemas.microsoft.com/office/drawing/2010/main">
+              <a14:hiddenFill xmlns:a14="http://schemas.microsoft.com/office/drawing/2010/main" xmlns:p="http://schemas.openxmlformats.org/presentationml/2006/main" xmlns:r="http://schemas.openxmlformats.org/officeDocument/2006/relationships" xmlns:a="http://schemas.openxmlformats.org/drawingml/2006/main" xmlns="">
                 <a:solidFill>
                   <a:srgbClr val="FFFFFF"/>
                 </a:solidFill>
@@ -5468,7 +5488,7 @@
           <a:blip r:embed="rId3">
             <a:extLst>
               <a:ext uri="{28A0092B-C50C-407E-A947-70E740481C1C}">
-                <a14:useLocalDpi xmlns:a14="http://schemas.microsoft.com/office/drawing/2010/main" val="0"/>
+                <a14:useLocalDpi xmlns:a14="http://schemas.microsoft.com/office/drawing/2010/main" xmlns:p="http://schemas.openxmlformats.org/presentationml/2006/main" xmlns:r="http://schemas.openxmlformats.org/officeDocument/2006/relationships" xmlns:a="http://schemas.openxmlformats.org/drawingml/2006/main" xmlns="" val="0"/>
               </a:ext>
             </a:extLst>
           </a:blip>
@@ -5488,7 +5508,7 @@
           <a:noFill/>
           <a:extLst>
             <a:ext uri="{909E8E84-426E-40DD-AFC4-6F175D3DCCD1}">
-              <a14:hiddenFill xmlns:a14="http://schemas.microsoft.com/office/drawing/2010/main">
+              <a14:hiddenFill xmlns:a14="http://schemas.microsoft.com/office/drawing/2010/main" xmlns:p="http://schemas.openxmlformats.org/presentationml/2006/main" xmlns:r="http://schemas.openxmlformats.org/officeDocument/2006/relationships" xmlns:a="http://schemas.openxmlformats.org/drawingml/2006/main" xmlns="">
                 <a:solidFill>
                   <a:srgbClr val="FFFFFF"/>
                 </a:solidFill>
@@ -5601,7 +5621,7 @@
           <a:blip r:embed="rId3">
             <a:extLst>
               <a:ext uri="{28A0092B-C50C-407E-A947-70E740481C1C}">
-                <a14:useLocalDpi xmlns:a14="http://schemas.microsoft.com/office/drawing/2010/main" val="0"/>
+                <a14:useLocalDpi xmlns:a14="http://schemas.microsoft.com/office/drawing/2010/main" xmlns:p="http://schemas.openxmlformats.org/presentationml/2006/main" xmlns:r="http://schemas.openxmlformats.org/officeDocument/2006/relationships" xmlns:a="http://schemas.openxmlformats.org/drawingml/2006/main" xmlns="" val="0"/>
               </a:ext>
             </a:extLst>
           </a:blip>
@@ -5621,7 +5641,7 @@
           <a:noFill/>
           <a:extLst>
             <a:ext uri="{909E8E84-426E-40DD-AFC4-6F175D3DCCD1}">
-              <a14:hiddenFill xmlns:a14="http://schemas.microsoft.com/office/drawing/2010/main">
+              <a14:hiddenFill xmlns:a14="http://schemas.microsoft.com/office/drawing/2010/main" xmlns:p="http://schemas.openxmlformats.org/presentationml/2006/main" xmlns:r="http://schemas.openxmlformats.org/officeDocument/2006/relationships" xmlns:a="http://schemas.openxmlformats.org/drawingml/2006/main" xmlns="">
                 <a:solidFill>
                   <a:srgbClr val="FFFFFF"/>
                 </a:solidFill>
@@ -5740,7 +5760,7 @@
             <a:blip r:embed="rId3">
               <a:extLst>
                 <a:ext uri="{28A0092B-C50C-407E-A947-70E740481C1C}">
-                  <a14:useLocalDpi xmlns:a14="http://schemas.microsoft.com/office/drawing/2010/main" val="0"/>
+                  <a14:useLocalDpi xmlns:a14="http://schemas.microsoft.com/office/drawing/2010/main" xmlns:p="http://schemas.openxmlformats.org/presentationml/2006/main" xmlns:r="http://schemas.openxmlformats.org/officeDocument/2006/relationships" xmlns:a="http://schemas.openxmlformats.org/drawingml/2006/main" xmlns="" val="0"/>
                 </a:ext>
               </a:extLst>
             </a:blip>
@@ -5760,7 +5780,7 @@
             <a:noFill/>
             <a:extLst>
               <a:ext uri="{909E8E84-426E-40DD-AFC4-6F175D3DCCD1}">
-                <a14:hiddenFill xmlns:a14="http://schemas.microsoft.com/office/drawing/2010/main">
+                <a14:hiddenFill xmlns:a14="http://schemas.microsoft.com/office/drawing/2010/main" xmlns:p="http://schemas.openxmlformats.org/presentationml/2006/main" xmlns:r="http://schemas.openxmlformats.org/officeDocument/2006/relationships" xmlns:a="http://schemas.openxmlformats.org/drawingml/2006/main" xmlns="">
                   <a:solidFill>
                     <a:srgbClr val="FFFFFF"/>
                   </a:solidFill>
@@ -5906,7 +5926,7 @@
           <a:blip r:embed="rId3">
             <a:extLst>
               <a:ext uri="{28A0092B-C50C-407E-A947-70E740481C1C}">
-                <a14:useLocalDpi xmlns:a14="http://schemas.microsoft.com/office/drawing/2010/main" val="0"/>
+                <a14:useLocalDpi xmlns:a14="http://schemas.microsoft.com/office/drawing/2010/main" xmlns:p="http://schemas.openxmlformats.org/presentationml/2006/main" xmlns:r="http://schemas.openxmlformats.org/officeDocument/2006/relationships" xmlns:a="http://schemas.openxmlformats.org/drawingml/2006/main" xmlns="" val="0"/>
               </a:ext>
             </a:extLst>
           </a:blip>
@@ -5926,7 +5946,7 @@
           <a:noFill/>
           <a:extLst>
             <a:ext uri="{909E8E84-426E-40DD-AFC4-6F175D3DCCD1}">
-              <a14:hiddenFill xmlns:a14="http://schemas.microsoft.com/office/drawing/2010/main">
+              <a14:hiddenFill xmlns:a14="http://schemas.microsoft.com/office/drawing/2010/main" xmlns:p="http://schemas.openxmlformats.org/presentationml/2006/main" xmlns:r="http://schemas.openxmlformats.org/officeDocument/2006/relationships" xmlns:a="http://schemas.openxmlformats.org/drawingml/2006/main" xmlns="">
                 <a:solidFill>
                   <a:srgbClr val="FFFFFF"/>
                 </a:solidFill>
@@ -6085,7 +6105,7 @@
             <a:blip r:embed="rId3">
               <a:extLst>
                 <a:ext uri="{28A0092B-C50C-407E-A947-70E740481C1C}">
-                  <a14:useLocalDpi xmlns:a14="http://schemas.microsoft.com/office/drawing/2010/main" val="0"/>
+                  <a14:useLocalDpi xmlns:a14="http://schemas.microsoft.com/office/drawing/2010/main" xmlns:p="http://schemas.openxmlformats.org/presentationml/2006/main" xmlns:r="http://schemas.openxmlformats.org/officeDocument/2006/relationships" xmlns:a="http://schemas.openxmlformats.org/drawingml/2006/main" xmlns="" val="0"/>
                 </a:ext>
               </a:extLst>
             </a:blip>
@@ -6105,7 +6125,7 @@
             <a:noFill/>
             <a:extLst>
               <a:ext uri="{909E8E84-426E-40DD-AFC4-6F175D3DCCD1}">
-                <a14:hiddenFill xmlns:a14="http://schemas.microsoft.com/office/drawing/2010/main">
+                <a14:hiddenFill xmlns:a14="http://schemas.microsoft.com/office/drawing/2010/main" xmlns:p="http://schemas.openxmlformats.org/presentationml/2006/main" xmlns:r="http://schemas.openxmlformats.org/officeDocument/2006/relationships" xmlns:a="http://schemas.openxmlformats.org/drawingml/2006/main" xmlns="">
                   <a:solidFill>
                     <a:srgbClr val="FFFFFF"/>
                   </a:solidFill>
@@ -6247,7 +6267,7 @@
             <a:blip r:embed="rId3">
               <a:extLst>
                 <a:ext uri="{28A0092B-C50C-407E-A947-70E740481C1C}">
-                  <a14:useLocalDpi xmlns:a14="http://schemas.microsoft.com/office/drawing/2010/main" val="0"/>
+                  <a14:useLocalDpi xmlns:a14="http://schemas.microsoft.com/office/drawing/2010/main" xmlns:p="http://schemas.openxmlformats.org/presentationml/2006/main" xmlns:r="http://schemas.openxmlformats.org/officeDocument/2006/relationships" xmlns:a="http://schemas.openxmlformats.org/drawingml/2006/main" xmlns="" val="0"/>
                 </a:ext>
               </a:extLst>
             </a:blip>
@@ -6267,7 +6287,7 @@
             <a:noFill/>
             <a:extLst>
               <a:ext uri="{909E8E84-426E-40DD-AFC4-6F175D3DCCD1}">
-                <a14:hiddenFill xmlns:a14="http://schemas.microsoft.com/office/drawing/2010/main">
+                <a14:hiddenFill xmlns:a14="http://schemas.microsoft.com/office/drawing/2010/main" xmlns:p="http://schemas.openxmlformats.org/presentationml/2006/main" xmlns:r="http://schemas.openxmlformats.org/officeDocument/2006/relationships" xmlns:a="http://schemas.openxmlformats.org/drawingml/2006/main" xmlns="">
                   <a:solidFill>
                     <a:srgbClr val="FFFFFF"/>
                   </a:solidFill>
@@ -6388,7 +6408,7 @@
     </p:spTree>
     <p:extLst>
       <p:ext uri="{BB962C8B-B14F-4D97-AF65-F5344CB8AC3E}">
-        <p14:creationId xmlns:p14="http://schemas.microsoft.com/office/powerpoint/2010/main" val="3716697069"/>
+        <p14:creationId xmlns:p14="http://schemas.microsoft.com/office/powerpoint/2010/main" xmlns:p="http://schemas.openxmlformats.org/presentationml/2006/main" xmlns:r="http://schemas.openxmlformats.org/officeDocument/2006/relationships" xmlns:a="http://schemas.openxmlformats.org/drawingml/2006/main" xmlns="" val="3716697069"/>
       </p:ext>
     </p:extLst>
   </p:cSld>
@@ -6399,7 +6419,7 @@
 </file>
 
 <file path=ppt/slides/slide4.xml><?xml version="1.0" encoding="utf-8"?>
-<p:sld xmlns:a="http://schemas.openxmlformats.org/drawingml/2006/main" xmlns:r="http://schemas.openxmlformats.org/officeDocument/2006/relationships" xmlns:p="http://schemas.openxmlformats.org/presentationml/2006/main">
+<p:sld xmlns:a="http://schemas.openxmlformats.org/drawingml/2006/main" xmlns:r="http://schemas.openxmlformats.org/officeDocument/2006/relationships" xmlns:mc="http://schemas.openxmlformats.org/markup-compatibility/2006" xmlns:mv="urn:schemas-microsoft-com:mac:vml" xmlns:p="http://schemas.openxmlformats.org/presentationml/2006/main" mc:Ignorable="mv" mc:PreserveAttributes="mv:*">
   <p:cSld>
     <p:spTree>
       <p:nvGrpSpPr>
@@ -6675,7 +6695,7 @@
           <a:blip r:embed="rId3">
             <a:extLst>
               <a:ext uri="{28A0092B-C50C-407E-A947-70E740481C1C}">
-                <a14:useLocalDpi xmlns:a14="http://schemas.microsoft.com/office/drawing/2010/main" val="0"/>
+                <a14:useLocalDpi xmlns:a14="http://schemas.microsoft.com/office/drawing/2010/main" xmlns:p="http://schemas.openxmlformats.org/presentationml/2006/main" xmlns:r="http://schemas.openxmlformats.org/officeDocument/2006/relationships" xmlns:a="http://schemas.openxmlformats.org/drawingml/2006/main" xmlns="" val="0"/>
               </a:ext>
             </a:extLst>
           </a:blip>
@@ -6695,7 +6715,7 @@
           <a:noFill/>
           <a:extLst>
             <a:ext uri="{909E8E84-426E-40DD-AFC4-6F175D3DCCD1}">
-              <a14:hiddenFill xmlns:a14="http://schemas.microsoft.com/office/drawing/2010/main">
+              <a14:hiddenFill xmlns:a14="http://schemas.microsoft.com/office/drawing/2010/main" xmlns:p="http://schemas.openxmlformats.org/presentationml/2006/main" xmlns:r="http://schemas.openxmlformats.org/officeDocument/2006/relationships" xmlns:a="http://schemas.openxmlformats.org/drawingml/2006/main" xmlns="">
                 <a:solidFill>
                   <a:srgbClr val="FFFFFF"/>
                 </a:solidFill>
@@ -6716,7 +6736,7 @@
           <a:blip r:embed="rId4">
             <a:extLst>
               <a:ext uri="{28A0092B-C50C-407E-A947-70E740481C1C}">
-                <a14:useLocalDpi xmlns:a14="http://schemas.microsoft.com/office/drawing/2010/main" val="0"/>
+                <a14:useLocalDpi xmlns:a14="http://schemas.microsoft.com/office/drawing/2010/main" xmlns:p="http://schemas.openxmlformats.org/presentationml/2006/main" xmlns:r="http://schemas.openxmlformats.org/officeDocument/2006/relationships" xmlns:a="http://schemas.openxmlformats.org/drawingml/2006/main" xmlns="" val="0"/>
               </a:ext>
             </a:extLst>
           </a:blip>
@@ -6736,7 +6756,7 @@
           <a:noFill/>
           <a:extLst>
             <a:ext uri="{909E8E84-426E-40DD-AFC4-6F175D3DCCD1}">
-              <a14:hiddenFill xmlns:a14="http://schemas.microsoft.com/office/drawing/2010/main">
+              <a14:hiddenFill xmlns:a14="http://schemas.microsoft.com/office/drawing/2010/main" xmlns:p="http://schemas.openxmlformats.org/presentationml/2006/main" xmlns:r="http://schemas.openxmlformats.org/officeDocument/2006/relationships" xmlns:a="http://schemas.openxmlformats.org/drawingml/2006/main" xmlns="">
                 <a:solidFill>
                   <a:srgbClr val="FFFFFF"/>
                 </a:solidFill>
@@ -6822,7 +6842,7 @@
           <a:blip r:embed="rId3">
             <a:extLst>
               <a:ext uri="{28A0092B-C50C-407E-A947-70E740481C1C}">
-                <a14:useLocalDpi xmlns:a14="http://schemas.microsoft.com/office/drawing/2010/main" val="0"/>
+                <a14:useLocalDpi xmlns:a14="http://schemas.microsoft.com/office/drawing/2010/main" xmlns:p="http://schemas.openxmlformats.org/presentationml/2006/main" xmlns:r="http://schemas.openxmlformats.org/officeDocument/2006/relationships" xmlns:a="http://schemas.openxmlformats.org/drawingml/2006/main" xmlns="" val="0"/>
               </a:ext>
             </a:extLst>
           </a:blip>
@@ -6842,7 +6862,7 @@
           <a:noFill/>
           <a:extLst>
             <a:ext uri="{909E8E84-426E-40DD-AFC4-6F175D3DCCD1}">
-              <a14:hiddenFill xmlns:a14="http://schemas.microsoft.com/office/drawing/2010/main">
+              <a14:hiddenFill xmlns:a14="http://schemas.microsoft.com/office/drawing/2010/main" xmlns:p="http://schemas.openxmlformats.org/presentationml/2006/main" xmlns:r="http://schemas.openxmlformats.org/officeDocument/2006/relationships" xmlns:a="http://schemas.openxmlformats.org/drawingml/2006/main" xmlns="">
                 <a:solidFill>
                   <a:srgbClr val="FFFFFF"/>
                 </a:solidFill>
@@ -6983,7 +7003,7 @@
             <a:blip r:embed="rId3">
               <a:extLst>
                 <a:ext uri="{28A0092B-C50C-407E-A947-70E740481C1C}">
-                  <a14:useLocalDpi xmlns:a14="http://schemas.microsoft.com/office/drawing/2010/main" val="0"/>
+                  <a14:useLocalDpi xmlns:a14="http://schemas.microsoft.com/office/drawing/2010/main" xmlns:p="http://schemas.openxmlformats.org/presentationml/2006/main" xmlns:r="http://schemas.openxmlformats.org/officeDocument/2006/relationships" xmlns:a="http://schemas.openxmlformats.org/drawingml/2006/main" xmlns="" val="0"/>
                 </a:ext>
               </a:extLst>
             </a:blip>
@@ -7003,7 +7023,7 @@
             <a:noFill/>
             <a:extLst>
               <a:ext uri="{909E8E84-426E-40DD-AFC4-6F175D3DCCD1}">
-                <a14:hiddenFill xmlns:a14="http://schemas.microsoft.com/office/drawing/2010/main">
+                <a14:hiddenFill xmlns:a14="http://schemas.microsoft.com/office/drawing/2010/main" xmlns:p="http://schemas.openxmlformats.org/presentationml/2006/main" xmlns:r="http://schemas.openxmlformats.org/officeDocument/2006/relationships" xmlns:a="http://schemas.openxmlformats.org/drawingml/2006/main" xmlns="">
                   <a:solidFill>
                     <a:srgbClr val="FFFFFF"/>
                   </a:solidFill>
@@ -7127,7 +7147,7 @@
           <a:blip r:embed="rId3">
             <a:extLst>
               <a:ext uri="{28A0092B-C50C-407E-A947-70E740481C1C}">
-                <a14:useLocalDpi xmlns:a14="http://schemas.microsoft.com/office/drawing/2010/main" val="0"/>
+                <a14:useLocalDpi xmlns:a14="http://schemas.microsoft.com/office/drawing/2010/main" xmlns:p="http://schemas.openxmlformats.org/presentationml/2006/main" xmlns:r="http://schemas.openxmlformats.org/officeDocument/2006/relationships" xmlns:a="http://schemas.openxmlformats.org/drawingml/2006/main" xmlns="" val="0"/>
               </a:ext>
             </a:extLst>
           </a:blip>
@@ -7147,7 +7167,7 @@
           <a:noFill/>
           <a:extLst>
             <a:ext uri="{909E8E84-426E-40DD-AFC4-6F175D3DCCD1}">
-              <a14:hiddenFill xmlns:a14="http://schemas.microsoft.com/office/drawing/2010/main">
+              <a14:hiddenFill xmlns:a14="http://schemas.microsoft.com/office/drawing/2010/main" xmlns:p="http://schemas.openxmlformats.org/presentationml/2006/main" xmlns:r="http://schemas.openxmlformats.org/officeDocument/2006/relationships" xmlns:a="http://schemas.openxmlformats.org/drawingml/2006/main" xmlns="">
                 <a:solidFill>
                   <a:srgbClr val="FFFFFF"/>
                 </a:solidFill>
@@ -7263,7 +7283,7 @@
             <a:blip r:embed="rId3">
               <a:extLst>
                 <a:ext uri="{28A0092B-C50C-407E-A947-70E740481C1C}">
-                  <a14:useLocalDpi xmlns:a14="http://schemas.microsoft.com/office/drawing/2010/main" val="0"/>
+                  <a14:useLocalDpi xmlns:a14="http://schemas.microsoft.com/office/drawing/2010/main" xmlns:p="http://schemas.openxmlformats.org/presentationml/2006/main" xmlns:r="http://schemas.openxmlformats.org/officeDocument/2006/relationships" xmlns:a="http://schemas.openxmlformats.org/drawingml/2006/main" xmlns="" val="0"/>
                 </a:ext>
               </a:extLst>
             </a:blip>
@@ -7283,7 +7303,7 @@
             <a:noFill/>
             <a:extLst>
               <a:ext uri="{909E8E84-426E-40DD-AFC4-6F175D3DCCD1}">
-                <a14:hiddenFill xmlns:a14="http://schemas.microsoft.com/office/drawing/2010/main">
+                <a14:hiddenFill xmlns:a14="http://schemas.microsoft.com/office/drawing/2010/main" xmlns:p="http://schemas.openxmlformats.org/presentationml/2006/main" xmlns:r="http://schemas.openxmlformats.org/officeDocument/2006/relationships" xmlns:a="http://schemas.openxmlformats.org/drawingml/2006/main" xmlns="">
                   <a:solidFill>
                     <a:srgbClr val="FFFFFF"/>
                   </a:solidFill>
@@ -7398,7 +7418,7 @@
     </p:spTree>
     <p:extLst>
       <p:ext uri="{BB962C8B-B14F-4D97-AF65-F5344CB8AC3E}">
-        <p14:creationId xmlns:p14="http://schemas.microsoft.com/office/powerpoint/2010/main" val="3132860025"/>
+        <p14:creationId xmlns:p14="http://schemas.microsoft.com/office/powerpoint/2010/main" xmlns:p="http://schemas.openxmlformats.org/presentationml/2006/main" xmlns:r="http://schemas.openxmlformats.org/officeDocument/2006/relationships" xmlns:a="http://schemas.openxmlformats.org/drawingml/2006/main" xmlns="" val="3132860025"/>
       </p:ext>
     </p:extLst>
   </p:cSld>
@@ -7409,7 +7429,7 @@
 </file>
 
 <file path=ppt/slides/slide5.xml><?xml version="1.0" encoding="utf-8"?>
-<p:sld xmlns:a="http://schemas.openxmlformats.org/drawingml/2006/main" xmlns:r="http://schemas.openxmlformats.org/officeDocument/2006/relationships" xmlns:p="http://schemas.openxmlformats.org/presentationml/2006/main">
+<p:sld xmlns:a="http://schemas.openxmlformats.org/drawingml/2006/main" xmlns:r="http://schemas.openxmlformats.org/officeDocument/2006/relationships" xmlns:mc="http://schemas.openxmlformats.org/markup-compatibility/2006" xmlns:mv="urn:schemas-microsoft-com:mac:vml" xmlns:p="http://schemas.openxmlformats.org/presentationml/2006/main" mc:Ignorable="mv" mc:PreserveAttributes="mv:*">
   <p:cSld>
     <p:spTree>
       <p:nvGrpSpPr>
@@ -7437,7 +7457,7 @@
           <a:blip r:embed="rId2">
             <a:extLst>
               <a:ext uri="{28A0092B-C50C-407E-A947-70E740481C1C}">
-                <a14:useLocalDpi xmlns:a14="http://schemas.microsoft.com/office/drawing/2010/main" val="0"/>
+                <a14:useLocalDpi xmlns:a14="http://schemas.microsoft.com/office/drawing/2010/main" xmlns:p="http://schemas.openxmlformats.org/presentationml/2006/main" xmlns:r="http://schemas.openxmlformats.org/officeDocument/2006/relationships" xmlns:a="http://schemas.openxmlformats.org/drawingml/2006/main" xmlns="" val="0"/>
               </a:ext>
             </a:extLst>
           </a:blip>
@@ -7461,14 +7481,14 @@
           <a:effectLst/>
           <a:extLst>
             <a:ext uri="{909E8E84-426E-40DD-AFC4-6F175D3DCCD1}">
-              <a14:hiddenFill xmlns:a14="http://schemas.microsoft.com/office/drawing/2010/main">
+              <a14:hiddenFill xmlns:a14="http://schemas.microsoft.com/office/drawing/2010/main" xmlns:p="http://schemas.openxmlformats.org/presentationml/2006/main" xmlns:r="http://schemas.openxmlformats.org/officeDocument/2006/relationships" xmlns:a="http://schemas.openxmlformats.org/drawingml/2006/main" xmlns="">
                 <a:solidFill>
                   <a:schemeClr val="accent1"/>
                 </a:solidFill>
               </a14:hiddenFill>
             </a:ext>
             <a:ext uri="{91240B29-F687-4F45-9708-019B960494DF}">
-              <a14:hiddenLine xmlns:a14="http://schemas.microsoft.com/office/drawing/2010/main" w="9525">
+              <a14:hiddenLine xmlns:a14="http://schemas.microsoft.com/office/drawing/2010/main" xmlns:p="http://schemas.openxmlformats.org/presentationml/2006/main" xmlns:r="http://schemas.openxmlformats.org/officeDocument/2006/relationships" xmlns:a="http://schemas.openxmlformats.org/drawingml/2006/main" xmlns="" w="9525">
                 <a:solidFill>
                   <a:schemeClr val="tx1"/>
                 </a:solidFill>
@@ -7478,7 +7498,7 @@
               </a14:hiddenLine>
             </a:ext>
             <a:ext uri="{AF507438-7753-43E0-B8FC-AC1667EBCBE1}">
-              <a14:hiddenEffects xmlns:a14="http://schemas.microsoft.com/office/drawing/2010/main">
+              <a14:hiddenEffects xmlns:a14="http://schemas.microsoft.com/office/drawing/2010/main" xmlns:p="http://schemas.openxmlformats.org/presentationml/2006/main" xmlns:r="http://schemas.openxmlformats.org/officeDocument/2006/relationships" xmlns:a="http://schemas.openxmlformats.org/drawingml/2006/main" xmlns="">
                 <a:effectLst>
                   <a:outerShdw dist="35921" dir="2700000" algn="ctr" rotWithShape="0">
                     <a:schemeClr val="bg2"/>
@@ -7492,7 +7512,7 @@
     </p:spTree>
     <p:extLst>
       <p:ext uri="{BB962C8B-B14F-4D97-AF65-F5344CB8AC3E}">
-        <p14:creationId xmlns:p14="http://schemas.microsoft.com/office/powerpoint/2010/main" val="2267528931"/>
+        <p14:creationId xmlns:p14="http://schemas.microsoft.com/office/powerpoint/2010/main" xmlns:p="http://schemas.openxmlformats.org/presentationml/2006/main" xmlns:r="http://schemas.openxmlformats.org/officeDocument/2006/relationships" xmlns:a="http://schemas.openxmlformats.org/drawingml/2006/main" xmlns="" val="2267528931"/>
       </p:ext>
     </p:extLst>
   </p:cSld>
@@ -7503,7 +7523,7 @@
 </file>
 
 <file path=ppt/slides/slide6.xml><?xml version="1.0" encoding="utf-8"?>
-<p:sld xmlns:a="http://schemas.openxmlformats.org/drawingml/2006/main" xmlns:r="http://schemas.openxmlformats.org/officeDocument/2006/relationships" xmlns:p="http://schemas.openxmlformats.org/presentationml/2006/main">
+<p:sld xmlns:a="http://schemas.openxmlformats.org/drawingml/2006/main" xmlns:r="http://schemas.openxmlformats.org/officeDocument/2006/relationships" xmlns:mc="http://schemas.openxmlformats.org/markup-compatibility/2006" xmlns:mv="urn:schemas-microsoft-com:mac:vml" xmlns:p="http://schemas.openxmlformats.org/presentationml/2006/main" mc:Ignorable="mv" mc:PreserveAttributes="mv:*">
   <p:cSld>
     <p:spTree>
       <p:nvGrpSpPr>
@@ -8647,7 +8667,7 @@
     </p:spTree>
     <p:extLst>
       <p:ext uri="{BB962C8B-B14F-4D97-AF65-F5344CB8AC3E}">
-        <p14:creationId xmlns:p14="http://schemas.microsoft.com/office/powerpoint/2010/main" val="2165162955"/>
+        <p14:creationId xmlns:p14="http://schemas.microsoft.com/office/powerpoint/2010/main" xmlns:p="http://schemas.openxmlformats.org/presentationml/2006/main" xmlns:r="http://schemas.openxmlformats.org/officeDocument/2006/relationships" xmlns:a="http://schemas.openxmlformats.org/drawingml/2006/main" xmlns="" val="2165162955"/>
       </p:ext>
     </p:extLst>
   </p:cSld>
@@ -8658,7 +8678,7 @@
 </file>
 
 <file path=ppt/slides/slide7.xml><?xml version="1.0" encoding="utf-8"?>
-<p:sld xmlns:a="http://schemas.openxmlformats.org/drawingml/2006/main" xmlns:r="http://schemas.openxmlformats.org/officeDocument/2006/relationships" xmlns:p="http://schemas.openxmlformats.org/presentationml/2006/main">
+<p:sld xmlns:a="http://schemas.openxmlformats.org/drawingml/2006/main" xmlns:r="http://schemas.openxmlformats.org/officeDocument/2006/relationships" xmlns:mc="http://schemas.openxmlformats.org/markup-compatibility/2006" xmlns:mv="urn:schemas-microsoft-com:mac:vml" xmlns:p="http://schemas.openxmlformats.org/presentationml/2006/main" mc:Ignorable="mv" mc:PreserveAttributes="mv:*">
   <p:cSld>
     <p:spTree>
       <p:nvGrpSpPr>
@@ -8896,28 +8916,20 @@
           <a:lstStyle/>
           <a:p>
             <a:r>
+              <a:rPr lang="fr-FR" sz="1600" dirty="0" smtClean="0">
+                <a:solidFill>
+                  <a:schemeClr val="tx1"/>
+                </a:solidFill>
+              </a:rPr>
+              <a:t>Fraunhofer </a:t>
+            </a:r>
+            <a:r>
               <a:rPr lang="fr-FR" sz="1600" dirty="0" err="1" smtClean="0">
                 <a:solidFill>
                   <a:schemeClr val="tx1"/>
                 </a:solidFill>
               </a:rPr>
               <a:t>Fokus</a:t>
-            </a:r>
-            <a:r>
-              <a:rPr lang="fr-FR" sz="1600" dirty="0">
-                <a:solidFill>
-                  <a:schemeClr val="tx1"/>
-                </a:solidFill>
-              </a:rPr>
-              <a:t> </a:t>
-            </a:r>
-            <a:r>
-              <a:rPr lang="fr-FR" sz="1600" dirty="0" err="1">
-                <a:solidFill>
-                  <a:schemeClr val="tx1"/>
-                </a:solidFill>
-              </a:rPr>
-              <a:t>fraunhofer</a:t>
             </a:r>
             <a:endParaRPr lang="fr-FR" sz="1600" dirty="0">
               <a:solidFill>
@@ -11035,7 +11047,7 @@
           <a:blip r:embed="rId2" cstate="print">
             <a:extLst>
               <a:ext uri="{28A0092B-C50C-407E-A947-70E740481C1C}">
-                <a14:useLocalDpi xmlns:a14="http://schemas.microsoft.com/office/drawing/2010/main" val="0"/>
+                <a14:useLocalDpi xmlns:a14="http://schemas.microsoft.com/office/drawing/2010/main" xmlns:p="http://schemas.openxmlformats.org/presentationml/2006/main" xmlns:r="http://schemas.openxmlformats.org/officeDocument/2006/relationships" xmlns:a="http://schemas.openxmlformats.org/drawingml/2006/main" xmlns="" val="0"/>
               </a:ext>
             </a:extLst>
           </a:blip>
@@ -11058,14 +11070,14 @@
           </a:ln>
           <a:extLst>
             <a:ext uri="{909E8E84-426E-40DD-AFC4-6F175D3DCCD1}">
-              <a14:hiddenFill xmlns:a14="http://schemas.microsoft.com/office/drawing/2010/main">
+              <a14:hiddenFill xmlns:a14="http://schemas.microsoft.com/office/drawing/2010/main" xmlns:p="http://schemas.openxmlformats.org/presentationml/2006/main" xmlns:r="http://schemas.openxmlformats.org/officeDocument/2006/relationships" xmlns:a="http://schemas.openxmlformats.org/drawingml/2006/main" xmlns="">
                 <a:solidFill>
                   <a:srgbClr val="FFFFFF"/>
                 </a:solidFill>
               </a14:hiddenFill>
             </a:ext>
             <a:ext uri="{91240B29-F687-4F45-9708-019B960494DF}">
-              <a14:hiddenLine xmlns:a14="http://schemas.microsoft.com/office/drawing/2010/main" w="9525">
+              <a14:hiddenLine xmlns:a14="http://schemas.microsoft.com/office/drawing/2010/main" xmlns:p="http://schemas.openxmlformats.org/presentationml/2006/main" xmlns:r="http://schemas.openxmlformats.org/officeDocument/2006/relationships" xmlns:a="http://schemas.openxmlformats.org/drawingml/2006/main" xmlns="" w="9525">
                 <a:solidFill>
                   <a:srgbClr val="000000"/>
                 </a:solidFill>
@@ -11089,7 +11101,7 @@
           <a:blip r:embed="rId3" cstate="print">
             <a:extLst>
               <a:ext uri="{28A0092B-C50C-407E-A947-70E740481C1C}">
-                <a14:useLocalDpi xmlns:a14="http://schemas.microsoft.com/office/drawing/2010/main" val="0"/>
+                <a14:useLocalDpi xmlns:a14="http://schemas.microsoft.com/office/drawing/2010/main" xmlns:p="http://schemas.openxmlformats.org/presentationml/2006/main" xmlns:r="http://schemas.openxmlformats.org/officeDocument/2006/relationships" xmlns:a="http://schemas.openxmlformats.org/drawingml/2006/main" xmlns="" val="0"/>
               </a:ext>
             </a:extLst>
           </a:blip>
@@ -11112,14 +11124,14 @@
           </a:ln>
           <a:extLst>
             <a:ext uri="{909E8E84-426E-40DD-AFC4-6F175D3DCCD1}">
-              <a14:hiddenFill xmlns:a14="http://schemas.microsoft.com/office/drawing/2010/main">
+              <a14:hiddenFill xmlns:a14="http://schemas.microsoft.com/office/drawing/2010/main" xmlns:p="http://schemas.openxmlformats.org/presentationml/2006/main" xmlns:r="http://schemas.openxmlformats.org/officeDocument/2006/relationships" xmlns:a="http://schemas.openxmlformats.org/drawingml/2006/main" xmlns="">
                 <a:solidFill>
                   <a:srgbClr val="FFFFFF"/>
                 </a:solidFill>
               </a14:hiddenFill>
             </a:ext>
             <a:ext uri="{91240B29-F687-4F45-9708-019B960494DF}">
-              <a14:hiddenLine xmlns:a14="http://schemas.microsoft.com/office/drawing/2010/main" w="9525">
+              <a14:hiddenLine xmlns:a14="http://schemas.microsoft.com/office/drawing/2010/main" xmlns:p="http://schemas.openxmlformats.org/presentationml/2006/main" xmlns:r="http://schemas.openxmlformats.org/officeDocument/2006/relationships" xmlns:a="http://schemas.openxmlformats.org/drawingml/2006/main" xmlns="" w="9525">
                 <a:solidFill>
                   <a:srgbClr val="000000"/>
                 </a:solidFill>
@@ -11143,7 +11155,7 @@
           <a:blip r:embed="rId2" cstate="print">
             <a:extLst>
               <a:ext uri="{28A0092B-C50C-407E-A947-70E740481C1C}">
-                <a14:useLocalDpi xmlns:a14="http://schemas.microsoft.com/office/drawing/2010/main" val="0"/>
+                <a14:useLocalDpi xmlns:a14="http://schemas.microsoft.com/office/drawing/2010/main" xmlns:p="http://schemas.openxmlformats.org/presentationml/2006/main" xmlns:r="http://schemas.openxmlformats.org/officeDocument/2006/relationships" xmlns:a="http://schemas.openxmlformats.org/drawingml/2006/main" xmlns="" val="0"/>
               </a:ext>
             </a:extLst>
           </a:blip>
@@ -11166,14 +11178,14 @@
           </a:ln>
           <a:extLst>
             <a:ext uri="{909E8E84-426E-40DD-AFC4-6F175D3DCCD1}">
-              <a14:hiddenFill xmlns:a14="http://schemas.microsoft.com/office/drawing/2010/main">
+              <a14:hiddenFill xmlns:a14="http://schemas.microsoft.com/office/drawing/2010/main" xmlns:p="http://schemas.openxmlformats.org/presentationml/2006/main" xmlns:r="http://schemas.openxmlformats.org/officeDocument/2006/relationships" xmlns:a="http://schemas.openxmlformats.org/drawingml/2006/main" xmlns="">
                 <a:solidFill>
                   <a:srgbClr val="FFFFFF"/>
                 </a:solidFill>
               </a14:hiddenFill>
             </a:ext>
             <a:ext uri="{91240B29-F687-4F45-9708-019B960494DF}">
-              <a14:hiddenLine xmlns:a14="http://schemas.microsoft.com/office/drawing/2010/main" w="9525">
+              <a14:hiddenLine xmlns:a14="http://schemas.microsoft.com/office/drawing/2010/main" xmlns:p="http://schemas.openxmlformats.org/presentationml/2006/main" xmlns:r="http://schemas.openxmlformats.org/officeDocument/2006/relationships" xmlns:a="http://schemas.openxmlformats.org/drawingml/2006/main" xmlns="" w="9525">
                 <a:solidFill>
                   <a:srgbClr val="000000"/>
                 </a:solidFill>
@@ -11197,7 +11209,7 @@
           <a:blip r:embed="rId2" cstate="print">
             <a:extLst>
               <a:ext uri="{28A0092B-C50C-407E-A947-70E740481C1C}">
-                <a14:useLocalDpi xmlns:a14="http://schemas.microsoft.com/office/drawing/2010/main" val="0"/>
+                <a14:useLocalDpi xmlns:a14="http://schemas.microsoft.com/office/drawing/2010/main" xmlns:p="http://schemas.openxmlformats.org/presentationml/2006/main" xmlns:r="http://schemas.openxmlformats.org/officeDocument/2006/relationships" xmlns:a="http://schemas.openxmlformats.org/drawingml/2006/main" xmlns="" val="0"/>
               </a:ext>
             </a:extLst>
           </a:blip>
@@ -11220,14 +11232,14 @@
           </a:ln>
           <a:extLst>
             <a:ext uri="{909E8E84-426E-40DD-AFC4-6F175D3DCCD1}">
-              <a14:hiddenFill xmlns:a14="http://schemas.microsoft.com/office/drawing/2010/main">
+              <a14:hiddenFill xmlns:a14="http://schemas.microsoft.com/office/drawing/2010/main" xmlns:p="http://schemas.openxmlformats.org/presentationml/2006/main" xmlns:r="http://schemas.openxmlformats.org/officeDocument/2006/relationships" xmlns:a="http://schemas.openxmlformats.org/drawingml/2006/main" xmlns="">
                 <a:solidFill>
                   <a:srgbClr val="FFFFFF"/>
                 </a:solidFill>
               </a14:hiddenFill>
             </a:ext>
             <a:ext uri="{91240B29-F687-4F45-9708-019B960494DF}">
-              <a14:hiddenLine xmlns:a14="http://schemas.microsoft.com/office/drawing/2010/main" w="9525">
+              <a14:hiddenLine xmlns:a14="http://schemas.microsoft.com/office/drawing/2010/main" xmlns:p="http://schemas.openxmlformats.org/presentationml/2006/main" xmlns:r="http://schemas.openxmlformats.org/officeDocument/2006/relationships" xmlns:a="http://schemas.openxmlformats.org/drawingml/2006/main" xmlns="" w="9525">
                 <a:solidFill>
                   <a:srgbClr val="000000"/>
                 </a:solidFill>
@@ -11251,7 +11263,7 @@
           <a:blip r:embed="rId2" cstate="print">
             <a:extLst>
               <a:ext uri="{28A0092B-C50C-407E-A947-70E740481C1C}">
-                <a14:useLocalDpi xmlns:a14="http://schemas.microsoft.com/office/drawing/2010/main" val="0"/>
+                <a14:useLocalDpi xmlns:a14="http://schemas.microsoft.com/office/drawing/2010/main" xmlns:p="http://schemas.openxmlformats.org/presentationml/2006/main" xmlns:r="http://schemas.openxmlformats.org/officeDocument/2006/relationships" xmlns:a="http://schemas.openxmlformats.org/drawingml/2006/main" xmlns="" val="0"/>
               </a:ext>
             </a:extLst>
           </a:blip>
@@ -11274,14 +11286,14 @@
           </a:ln>
           <a:extLst>
             <a:ext uri="{909E8E84-426E-40DD-AFC4-6F175D3DCCD1}">
-              <a14:hiddenFill xmlns:a14="http://schemas.microsoft.com/office/drawing/2010/main">
+              <a14:hiddenFill xmlns:a14="http://schemas.microsoft.com/office/drawing/2010/main" xmlns:p="http://schemas.openxmlformats.org/presentationml/2006/main" xmlns:r="http://schemas.openxmlformats.org/officeDocument/2006/relationships" xmlns:a="http://schemas.openxmlformats.org/drawingml/2006/main" xmlns="">
                 <a:solidFill>
                   <a:srgbClr val="FFFFFF"/>
                 </a:solidFill>
               </a14:hiddenFill>
             </a:ext>
             <a:ext uri="{91240B29-F687-4F45-9708-019B960494DF}">
-              <a14:hiddenLine xmlns:a14="http://schemas.microsoft.com/office/drawing/2010/main" w="9525">
+              <a14:hiddenLine xmlns:a14="http://schemas.microsoft.com/office/drawing/2010/main" xmlns:p="http://schemas.openxmlformats.org/presentationml/2006/main" xmlns:r="http://schemas.openxmlformats.org/officeDocument/2006/relationships" xmlns:a="http://schemas.openxmlformats.org/drawingml/2006/main" xmlns="" w="9525">
                 <a:solidFill>
                   <a:srgbClr val="000000"/>
                 </a:solidFill>
@@ -11305,7 +11317,7 @@
           <a:blip r:embed="rId2" cstate="print">
             <a:extLst>
               <a:ext uri="{28A0092B-C50C-407E-A947-70E740481C1C}">
-                <a14:useLocalDpi xmlns:a14="http://schemas.microsoft.com/office/drawing/2010/main" val="0"/>
+                <a14:useLocalDpi xmlns:a14="http://schemas.microsoft.com/office/drawing/2010/main" xmlns:p="http://schemas.openxmlformats.org/presentationml/2006/main" xmlns:r="http://schemas.openxmlformats.org/officeDocument/2006/relationships" xmlns:a="http://schemas.openxmlformats.org/drawingml/2006/main" xmlns="" val="0"/>
               </a:ext>
             </a:extLst>
           </a:blip>
@@ -11328,14 +11340,14 @@
           </a:ln>
           <a:extLst>
             <a:ext uri="{909E8E84-426E-40DD-AFC4-6F175D3DCCD1}">
-              <a14:hiddenFill xmlns:a14="http://schemas.microsoft.com/office/drawing/2010/main">
+              <a14:hiddenFill xmlns:a14="http://schemas.microsoft.com/office/drawing/2010/main" xmlns:p="http://schemas.openxmlformats.org/presentationml/2006/main" xmlns:r="http://schemas.openxmlformats.org/officeDocument/2006/relationships" xmlns:a="http://schemas.openxmlformats.org/drawingml/2006/main" xmlns="">
                 <a:solidFill>
                   <a:srgbClr val="FFFFFF"/>
                 </a:solidFill>
               </a14:hiddenFill>
             </a:ext>
             <a:ext uri="{91240B29-F687-4F45-9708-019B960494DF}">
-              <a14:hiddenLine xmlns:a14="http://schemas.microsoft.com/office/drawing/2010/main" w="9525">
+              <a14:hiddenLine xmlns:a14="http://schemas.microsoft.com/office/drawing/2010/main" xmlns:p="http://schemas.openxmlformats.org/presentationml/2006/main" xmlns:r="http://schemas.openxmlformats.org/officeDocument/2006/relationships" xmlns:a="http://schemas.openxmlformats.org/drawingml/2006/main" xmlns="" w="9525">
                 <a:solidFill>
                   <a:srgbClr val="000000"/>
                 </a:solidFill>
@@ -11359,7 +11371,7 @@
           <a:blip r:embed="rId4" cstate="print">
             <a:extLst>
               <a:ext uri="{28A0092B-C50C-407E-A947-70E740481C1C}">
-                <a14:useLocalDpi xmlns:a14="http://schemas.microsoft.com/office/drawing/2010/main" val="0"/>
+                <a14:useLocalDpi xmlns:a14="http://schemas.microsoft.com/office/drawing/2010/main" xmlns:p="http://schemas.openxmlformats.org/presentationml/2006/main" xmlns:r="http://schemas.openxmlformats.org/officeDocument/2006/relationships" xmlns:a="http://schemas.openxmlformats.org/drawingml/2006/main" xmlns="" val="0"/>
               </a:ext>
             </a:extLst>
           </a:blip>
@@ -11382,14 +11394,14 @@
           </a:ln>
           <a:extLst>
             <a:ext uri="{909E8E84-426E-40DD-AFC4-6F175D3DCCD1}">
-              <a14:hiddenFill xmlns:a14="http://schemas.microsoft.com/office/drawing/2010/main">
+              <a14:hiddenFill xmlns:a14="http://schemas.microsoft.com/office/drawing/2010/main" xmlns:p="http://schemas.openxmlformats.org/presentationml/2006/main" xmlns:r="http://schemas.openxmlformats.org/officeDocument/2006/relationships" xmlns:a="http://schemas.openxmlformats.org/drawingml/2006/main" xmlns="">
                 <a:solidFill>
                   <a:srgbClr val="FFFFFF"/>
                 </a:solidFill>
               </a14:hiddenFill>
             </a:ext>
             <a:ext uri="{91240B29-F687-4F45-9708-019B960494DF}">
-              <a14:hiddenLine xmlns:a14="http://schemas.microsoft.com/office/drawing/2010/main" w="9525">
+              <a14:hiddenLine xmlns:a14="http://schemas.microsoft.com/office/drawing/2010/main" xmlns:p="http://schemas.openxmlformats.org/presentationml/2006/main" xmlns:r="http://schemas.openxmlformats.org/officeDocument/2006/relationships" xmlns:a="http://schemas.openxmlformats.org/drawingml/2006/main" xmlns="" w="9525">
                 <a:solidFill>
                   <a:srgbClr val="000000"/>
                 </a:solidFill>
@@ -11413,7 +11425,7 @@
           <a:blip r:embed="rId5" cstate="print">
             <a:extLst>
               <a:ext uri="{28A0092B-C50C-407E-A947-70E740481C1C}">
-                <a14:useLocalDpi xmlns:a14="http://schemas.microsoft.com/office/drawing/2010/main" val="0"/>
+                <a14:useLocalDpi xmlns:a14="http://schemas.microsoft.com/office/drawing/2010/main" xmlns:p="http://schemas.openxmlformats.org/presentationml/2006/main" xmlns:r="http://schemas.openxmlformats.org/officeDocument/2006/relationships" xmlns:a="http://schemas.openxmlformats.org/drawingml/2006/main" xmlns="" val="0"/>
               </a:ext>
             </a:extLst>
           </a:blip>
@@ -11436,14 +11448,14 @@
           </a:ln>
           <a:extLst>
             <a:ext uri="{909E8E84-426E-40DD-AFC4-6F175D3DCCD1}">
-              <a14:hiddenFill xmlns:a14="http://schemas.microsoft.com/office/drawing/2010/main">
+              <a14:hiddenFill xmlns:a14="http://schemas.microsoft.com/office/drawing/2010/main" xmlns:p="http://schemas.openxmlformats.org/presentationml/2006/main" xmlns:r="http://schemas.openxmlformats.org/officeDocument/2006/relationships" xmlns:a="http://schemas.openxmlformats.org/drawingml/2006/main" xmlns="">
                 <a:solidFill>
                   <a:srgbClr val="FFFFFF"/>
                 </a:solidFill>
               </a14:hiddenFill>
             </a:ext>
             <a:ext uri="{91240B29-F687-4F45-9708-019B960494DF}">
-              <a14:hiddenLine xmlns:a14="http://schemas.microsoft.com/office/drawing/2010/main" w="9525">
+              <a14:hiddenLine xmlns:a14="http://schemas.microsoft.com/office/drawing/2010/main" xmlns:p="http://schemas.openxmlformats.org/presentationml/2006/main" xmlns:r="http://schemas.openxmlformats.org/officeDocument/2006/relationships" xmlns:a="http://schemas.openxmlformats.org/drawingml/2006/main" xmlns="" w="9525">
                 <a:solidFill>
                   <a:srgbClr val="000000"/>
                 </a:solidFill>
@@ -11467,7 +11479,7 @@
           <a:blip r:embed="rId5" cstate="print">
             <a:extLst>
               <a:ext uri="{28A0092B-C50C-407E-A947-70E740481C1C}">
-                <a14:useLocalDpi xmlns:a14="http://schemas.microsoft.com/office/drawing/2010/main" val="0"/>
+                <a14:useLocalDpi xmlns:a14="http://schemas.microsoft.com/office/drawing/2010/main" xmlns:p="http://schemas.openxmlformats.org/presentationml/2006/main" xmlns:r="http://schemas.openxmlformats.org/officeDocument/2006/relationships" xmlns:a="http://schemas.openxmlformats.org/drawingml/2006/main" xmlns="" val="0"/>
               </a:ext>
             </a:extLst>
           </a:blip>
@@ -11490,14 +11502,14 @@
           </a:ln>
           <a:extLst>
             <a:ext uri="{909E8E84-426E-40DD-AFC4-6F175D3DCCD1}">
-              <a14:hiddenFill xmlns:a14="http://schemas.microsoft.com/office/drawing/2010/main">
+              <a14:hiddenFill xmlns:a14="http://schemas.microsoft.com/office/drawing/2010/main" xmlns:p="http://schemas.openxmlformats.org/presentationml/2006/main" xmlns:r="http://schemas.openxmlformats.org/officeDocument/2006/relationships" xmlns:a="http://schemas.openxmlformats.org/drawingml/2006/main" xmlns="">
                 <a:solidFill>
                   <a:srgbClr val="FFFFFF"/>
                 </a:solidFill>
               </a14:hiddenFill>
             </a:ext>
             <a:ext uri="{91240B29-F687-4F45-9708-019B960494DF}">
-              <a14:hiddenLine xmlns:a14="http://schemas.microsoft.com/office/drawing/2010/main" w="9525">
+              <a14:hiddenLine xmlns:a14="http://schemas.microsoft.com/office/drawing/2010/main" xmlns:p="http://schemas.openxmlformats.org/presentationml/2006/main" xmlns:r="http://schemas.openxmlformats.org/officeDocument/2006/relationships" xmlns:a="http://schemas.openxmlformats.org/drawingml/2006/main" xmlns="" w="9525">
                 <a:solidFill>
                   <a:srgbClr val="000000"/>
                 </a:solidFill>
@@ -11521,7 +11533,7 @@
           <a:blip r:embed="rId5" cstate="print">
             <a:extLst>
               <a:ext uri="{28A0092B-C50C-407E-A947-70E740481C1C}">
-                <a14:useLocalDpi xmlns:a14="http://schemas.microsoft.com/office/drawing/2010/main" val="0"/>
+                <a14:useLocalDpi xmlns:a14="http://schemas.microsoft.com/office/drawing/2010/main" xmlns:p="http://schemas.openxmlformats.org/presentationml/2006/main" xmlns:r="http://schemas.openxmlformats.org/officeDocument/2006/relationships" xmlns:a="http://schemas.openxmlformats.org/drawingml/2006/main" xmlns="" val="0"/>
               </a:ext>
             </a:extLst>
           </a:blip>
@@ -11544,14 +11556,14 @@
           </a:ln>
           <a:extLst>
             <a:ext uri="{909E8E84-426E-40DD-AFC4-6F175D3DCCD1}">
-              <a14:hiddenFill xmlns:a14="http://schemas.microsoft.com/office/drawing/2010/main">
+              <a14:hiddenFill xmlns:a14="http://schemas.microsoft.com/office/drawing/2010/main" xmlns:p="http://schemas.openxmlformats.org/presentationml/2006/main" xmlns:r="http://schemas.openxmlformats.org/officeDocument/2006/relationships" xmlns:a="http://schemas.openxmlformats.org/drawingml/2006/main" xmlns="">
                 <a:solidFill>
                   <a:srgbClr val="FFFFFF"/>
                 </a:solidFill>
               </a14:hiddenFill>
             </a:ext>
             <a:ext uri="{91240B29-F687-4F45-9708-019B960494DF}">
-              <a14:hiddenLine xmlns:a14="http://schemas.microsoft.com/office/drawing/2010/main" w="9525">
+              <a14:hiddenLine xmlns:a14="http://schemas.microsoft.com/office/drawing/2010/main" xmlns:p="http://schemas.openxmlformats.org/presentationml/2006/main" xmlns:r="http://schemas.openxmlformats.org/officeDocument/2006/relationships" xmlns:a="http://schemas.openxmlformats.org/drawingml/2006/main" xmlns="" w="9525">
                 <a:solidFill>
                   <a:srgbClr val="000000"/>
                 </a:solidFill>
@@ -11575,7 +11587,7 @@
           <a:blip r:embed="rId3" cstate="print">
             <a:extLst>
               <a:ext uri="{28A0092B-C50C-407E-A947-70E740481C1C}">
-                <a14:useLocalDpi xmlns:a14="http://schemas.microsoft.com/office/drawing/2010/main" val="0"/>
+                <a14:useLocalDpi xmlns:a14="http://schemas.microsoft.com/office/drawing/2010/main" xmlns:p="http://schemas.openxmlformats.org/presentationml/2006/main" xmlns:r="http://schemas.openxmlformats.org/officeDocument/2006/relationships" xmlns:a="http://schemas.openxmlformats.org/drawingml/2006/main" xmlns="" val="0"/>
               </a:ext>
             </a:extLst>
           </a:blip>
@@ -11598,14 +11610,14 @@
           </a:ln>
           <a:extLst>
             <a:ext uri="{909E8E84-426E-40DD-AFC4-6F175D3DCCD1}">
-              <a14:hiddenFill xmlns:a14="http://schemas.microsoft.com/office/drawing/2010/main">
+              <a14:hiddenFill xmlns:a14="http://schemas.microsoft.com/office/drawing/2010/main" xmlns:p="http://schemas.openxmlformats.org/presentationml/2006/main" xmlns:r="http://schemas.openxmlformats.org/officeDocument/2006/relationships" xmlns:a="http://schemas.openxmlformats.org/drawingml/2006/main" xmlns="">
                 <a:solidFill>
                   <a:srgbClr val="FFFFFF"/>
                 </a:solidFill>
               </a14:hiddenFill>
             </a:ext>
             <a:ext uri="{91240B29-F687-4F45-9708-019B960494DF}">
-              <a14:hiddenLine xmlns:a14="http://schemas.microsoft.com/office/drawing/2010/main" w="9525">
+              <a14:hiddenLine xmlns:a14="http://schemas.microsoft.com/office/drawing/2010/main" xmlns:p="http://schemas.openxmlformats.org/presentationml/2006/main" xmlns:r="http://schemas.openxmlformats.org/officeDocument/2006/relationships" xmlns:a="http://schemas.openxmlformats.org/drawingml/2006/main" xmlns="" w="9525">
                 <a:solidFill>
                   <a:srgbClr val="000000"/>
                 </a:solidFill>
@@ -11629,7 +11641,7 @@
           <a:blip r:embed="rId3" cstate="print">
             <a:extLst>
               <a:ext uri="{28A0092B-C50C-407E-A947-70E740481C1C}">
-                <a14:useLocalDpi xmlns:a14="http://schemas.microsoft.com/office/drawing/2010/main" val="0"/>
+                <a14:useLocalDpi xmlns:a14="http://schemas.microsoft.com/office/drawing/2010/main" xmlns:p="http://schemas.openxmlformats.org/presentationml/2006/main" xmlns:r="http://schemas.openxmlformats.org/officeDocument/2006/relationships" xmlns:a="http://schemas.openxmlformats.org/drawingml/2006/main" xmlns="" val="0"/>
               </a:ext>
             </a:extLst>
           </a:blip>
@@ -11652,14 +11664,14 @@
           </a:ln>
           <a:extLst>
             <a:ext uri="{909E8E84-426E-40DD-AFC4-6F175D3DCCD1}">
-              <a14:hiddenFill xmlns:a14="http://schemas.microsoft.com/office/drawing/2010/main">
+              <a14:hiddenFill xmlns:a14="http://schemas.microsoft.com/office/drawing/2010/main" xmlns:p="http://schemas.openxmlformats.org/presentationml/2006/main" xmlns:r="http://schemas.openxmlformats.org/officeDocument/2006/relationships" xmlns:a="http://schemas.openxmlformats.org/drawingml/2006/main" xmlns="">
                 <a:solidFill>
                   <a:srgbClr val="FFFFFF"/>
                 </a:solidFill>
               </a14:hiddenFill>
             </a:ext>
             <a:ext uri="{91240B29-F687-4F45-9708-019B960494DF}">
-              <a14:hiddenLine xmlns:a14="http://schemas.microsoft.com/office/drawing/2010/main" w="9525">
+              <a14:hiddenLine xmlns:a14="http://schemas.microsoft.com/office/drawing/2010/main" xmlns:p="http://schemas.openxmlformats.org/presentationml/2006/main" xmlns:r="http://schemas.openxmlformats.org/officeDocument/2006/relationships" xmlns:a="http://schemas.openxmlformats.org/drawingml/2006/main" xmlns="" w="9525">
                 <a:solidFill>
                   <a:srgbClr val="000000"/>
                 </a:solidFill>
@@ -11683,7 +11695,7 @@
           <a:blip r:embed="rId3" cstate="print">
             <a:extLst>
               <a:ext uri="{28A0092B-C50C-407E-A947-70E740481C1C}">
-                <a14:useLocalDpi xmlns:a14="http://schemas.microsoft.com/office/drawing/2010/main" val="0"/>
+                <a14:useLocalDpi xmlns:a14="http://schemas.microsoft.com/office/drawing/2010/main" xmlns:p="http://schemas.openxmlformats.org/presentationml/2006/main" xmlns:r="http://schemas.openxmlformats.org/officeDocument/2006/relationships" xmlns:a="http://schemas.openxmlformats.org/drawingml/2006/main" xmlns="" val="0"/>
               </a:ext>
             </a:extLst>
           </a:blip>
@@ -11706,14 +11718,14 @@
           </a:ln>
           <a:extLst>
             <a:ext uri="{909E8E84-426E-40DD-AFC4-6F175D3DCCD1}">
-              <a14:hiddenFill xmlns:a14="http://schemas.microsoft.com/office/drawing/2010/main">
+              <a14:hiddenFill xmlns:a14="http://schemas.microsoft.com/office/drawing/2010/main" xmlns:p="http://schemas.openxmlformats.org/presentationml/2006/main" xmlns:r="http://schemas.openxmlformats.org/officeDocument/2006/relationships" xmlns:a="http://schemas.openxmlformats.org/drawingml/2006/main" xmlns="">
                 <a:solidFill>
                   <a:srgbClr val="FFFFFF"/>
                 </a:solidFill>
               </a14:hiddenFill>
             </a:ext>
             <a:ext uri="{91240B29-F687-4F45-9708-019B960494DF}">
-              <a14:hiddenLine xmlns:a14="http://schemas.microsoft.com/office/drawing/2010/main" w="9525">
+              <a14:hiddenLine xmlns:a14="http://schemas.microsoft.com/office/drawing/2010/main" xmlns:p="http://schemas.openxmlformats.org/presentationml/2006/main" xmlns:r="http://schemas.openxmlformats.org/officeDocument/2006/relationships" xmlns:a="http://schemas.openxmlformats.org/drawingml/2006/main" xmlns="" w="9525">
                 <a:solidFill>
                   <a:srgbClr val="000000"/>
                 </a:solidFill>
@@ -11737,7 +11749,7 @@
           <a:blip r:embed="rId3" cstate="print">
             <a:extLst>
               <a:ext uri="{28A0092B-C50C-407E-A947-70E740481C1C}">
-                <a14:useLocalDpi xmlns:a14="http://schemas.microsoft.com/office/drawing/2010/main" val="0"/>
+                <a14:useLocalDpi xmlns:a14="http://schemas.microsoft.com/office/drawing/2010/main" xmlns:p="http://schemas.openxmlformats.org/presentationml/2006/main" xmlns:r="http://schemas.openxmlformats.org/officeDocument/2006/relationships" xmlns:a="http://schemas.openxmlformats.org/drawingml/2006/main" xmlns="" val="0"/>
               </a:ext>
             </a:extLst>
           </a:blip>
@@ -11760,14 +11772,14 @@
           </a:ln>
           <a:extLst>
             <a:ext uri="{909E8E84-426E-40DD-AFC4-6F175D3DCCD1}">
-              <a14:hiddenFill xmlns:a14="http://schemas.microsoft.com/office/drawing/2010/main">
+              <a14:hiddenFill xmlns:a14="http://schemas.microsoft.com/office/drawing/2010/main" xmlns:p="http://schemas.openxmlformats.org/presentationml/2006/main" xmlns:r="http://schemas.openxmlformats.org/officeDocument/2006/relationships" xmlns:a="http://schemas.openxmlformats.org/drawingml/2006/main" xmlns="">
                 <a:solidFill>
                   <a:srgbClr val="FFFFFF"/>
                 </a:solidFill>
               </a14:hiddenFill>
             </a:ext>
             <a:ext uri="{91240B29-F687-4F45-9708-019B960494DF}">
-              <a14:hiddenLine xmlns:a14="http://schemas.microsoft.com/office/drawing/2010/main" w="9525">
+              <a14:hiddenLine xmlns:a14="http://schemas.microsoft.com/office/drawing/2010/main" xmlns:p="http://schemas.openxmlformats.org/presentationml/2006/main" xmlns:r="http://schemas.openxmlformats.org/officeDocument/2006/relationships" xmlns:a="http://schemas.openxmlformats.org/drawingml/2006/main" xmlns="" w="9525">
                 <a:solidFill>
                   <a:srgbClr val="000000"/>
                 </a:solidFill>
@@ -11791,7 +11803,7 @@
           <a:blip r:embed="rId6" cstate="print">
             <a:extLst>
               <a:ext uri="{28A0092B-C50C-407E-A947-70E740481C1C}">
-                <a14:useLocalDpi xmlns:a14="http://schemas.microsoft.com/office/drawing/2010/main" val="0"/>
+                <a14:useLocalDpi xmlns:a14="http://schemas.microsoft.com/office/drawing/2010/main" xmlns:p="http://schemas.openxmlformats.org/presentationml/2006/main" xmlns:r="http://schemas.openxmlformats.org/officeDocument/2006/relationships" xmlns:a="http://schemas.openxmlformats.org/drawingml/2006/main" xmlns="" val="0"/>
               </a:ext>
             </a:extLst>
           </a:blip>
@@ -11814,14 +11826,14 @@
           </a:ln>
           <a:extLst>
             <a:ext uri="{909E8E84-426E-40DD-AFC4-6F175D3DCCD1}">
-              <a14:hiddenFill xmlns:a14="http://schemas.microsoft.com/office/drawing/2010/main">
+              <a14:hiddenFill xmlns:a14="http://schemas.microsoft.com/office/drawing/2010/main" xmlns:p="http://schemas.openxmlformats.org/presentationml/2006/main" xmlns:r="http://schemas.openxmlformats.org/officeDocument/2006/relationships" xmlns:a="http://schemas.openxmlformats.org/drawingml/2006/main" xmlns="">
                 <a:solidFill>
                   <a:srgbClr val="FFFFFF"/>
                 </a:solidFill>
               </a14:hiddenFill>
             </a:ext>
             <a:ext uri="{91240B29-F687-4F45-9708-019B960494DF}">
-              <a14:hiddenLine xmlns:a14="http://schemas.microsoft.com/office/drawing/2010/main" w="9525">
+              <a14:hiddenLine xmlns:a14="http://schemas.microsoft.com/office/drawing/2010/main" xmlns:p="http://schemas.openxmlformats.org/presentationml/2006/main" xmlns:r="http://schemas.openxmlformats.org/officeDocument/2006/relationships" xmlns:a="http://schemas.openxmlformats.org/drawingml/2006/main" xmlns="" w="9525">
                 <a:solidFill>
                   <a:srgbClr val="000000"/>
                 </a:solidFill>
@@ -11845,7 +11857,7 @@
           <a:blip r:embed="rId6" cstate="print">
             <a:extLst>
               <a:ext uri="{28A0092B-C50C-407E-A947-70E740481C1C}">
-                <a14:useLocalDpi xmlns:a14="http://schemas.microsoft.com/office/drawing/2010/main" val="0"/>
+                <a14:useLocalDpi xmlns:a14="http://schemas.microsoft.com/office/drawing/2010/main" xmlns:p="http://schemas.openxmlformats.org/presentationml/2006/main" xmlns:r="http://schemas.openxmlformats.org/officeDocument/2006/relationships" xmlns:a="http://schemas.openxmlformats.org/drawingml/2006/main" xmlns="" val="0"/>
               </a:ext>
             </a:extLst>
           </a:blip>
@@ -11868,14 +11880,14 @@
           </a:ln>
           <a:extLst>
             <a:ext uri="{909E8E84-426E-40DD-AFC4-6F175D3DCCD1}">
-              <a14:hiddenFill xmlns:a14="http://schemas.microsoft.com/office/drawing/2010/main">
+              <a14:hiddenFill xmlns:a14="http://schemas.microsoft.com/office/drawing/2010/main" xmlns:p="http://schemas.openxmlformats.org/presentationml/2006/main" xmlns:r="http://schemas.openxmlformats.org/officeDocument/2006/relationships" xmlns:a="http://schemas.openxmlformats.org/drawingml/2006/main" xmlns="">
                 <a:solidFill>
                   <a:srgbClr val="FFFFFF"/>
                 </a:solidFill>
               </a14:hiddenFill>
             </a:ext>
             <a:ext uri="{91240B29-F687-4F45-9708-019B960494DF}">
-              <a14:hiddenLine xmlns:a14="http://schemas.microsoft.com/office/drawing/2010/main" w="9525">
+              <a14:hiddenLine xmlns:a14="http://schemas.microsoft.com/office/drawing/2010/main" xmlns:p="http://schemas.openxmlformats.org/presentationml/2006/main" xmlns:r="http://schemas.openxmlformats.org/officeDocument/2006/relationships" xmlns:a="http://schemas.openxmlformats.org/drawingml/2006/main" xmlns="" w="9525">
                 <a:solidFill>
                   <a:srgbClr val="000000"/>
                 </a:solidFill>
@@ -11899,7 +11911,7 @@
           <a:blip r:embed="rId6" cstate="print">
             <a:extLst>
               <a:ext uri="{28A0092B-C50C-407E-A947-70E740481C1C}">
-                <a14:useLocalDpi xmlns:a14="http://schemas.microsoft.com/office/drawing/2010/main" val="0"/>
+                <a14:useLocalDpi xmlns:a14="http://schemas.microsoft.com/office/drawing/2010/main" xmlns:p="http://schemas.openxmlformats.org/presentationml/2006/main" xmlns:r="http://schemas.openxmlformats.org/officeDocument/2006/relationships" xmlns:a="http://schemas.openxmlformats.org/drawingml/2006/main" xmlns="" val="0"/>
               </a:ext>
             </a:extLst>
           </a:blip>
@@ -11922,14 +11934,14 @@
           </a:ln>
           <a:extLst>
             <a:ext uri="{909E8E84-426E-40DD-AFC4-6F175D3DCCD1}">
-              <a14:hiddenFill xmlns:a14="http://schemas.microsoft.com/office/drawing/2010/main">
+              <a14:hiddenFill xmlns:a14="http://schemas.microsoft.com/office/drawing/2010/main" xmlns:p="http://schemas.openxmlformats.org/presentationml/2006/main" xmlns:r="http://schemas.openxmlformats.org/officeDocument/2006/relationships" xmlns:a="http://schemas.openxmlformats.org/drawingml/2006/main" xmlns="">
                 <a:solidFill>
                   <a:srgbClr val="FFFFFF"/>
                 </a:solidFill>
               </a14:hiddenFill>
             </a:ext>
             <a:ext uri="{91240B29-F687-4F45-9708-019B960494DF}">
-              <a14:hiddenLine xmlns:a14="http://schemas.microsoft.com/office/drawing/2010/main" w="9525">
+              <a14:hiddenLine xmlns:a14="http://schemas.microsoft.com/office/drawing/2010/main" xmlns:p="http://schemas.openxmlformats.org/presentationml/2006/main" xmlns:r="http://schemas.openxmlformats.org/officeDocument/2006/relationships" xmlns:a="http://schemas.openxmlformats.org/drawingml/2006/main" xmlns="" w="9525">
                 <a:solidFill>
                   <a:srgbClr val="000000"/>
                 </a:solidFill>
@@ -11953,7 +11965,7 @@
           <a:blip r:embed="rId7" cstate="print">
             <a:extLst>
               <a:ext uri="{28A0092B-C50C-407E-A947-70E740481C1C}">
-                <a14:useLocalDpi xmlns:a14="http://schemas.microsoft.com/office/drawing/2010/main" val="0"/>
+                <a14:useLocalDpi xmlns:a14="http://schemas.microsoft.com/office/drawing/2010/main" xmlns:p="http://schemas.openxmlformats.org/presentationml/2006/main" xmlns:r="http://schemas.openxmlformats.org/officeDocument/2006/relationships" xmlns:a="http://schemas.openxmlformats.org/drawingml/2006/main" xmlns="" val="0"/>
               </a:ext>
             </a:extLst>
           </a:blip>
@@ -11973,7 +11985,7 @@
           <a:noFill/>
           <a:extLst>
             <a:ext uri="{909E8E84-426E-40DD-AFC4-6F175D3DCCD1}">
-              <a14:hiddenFill xmlns:a14="http://schemas.microsoft.com/office/drawing/2010/main">
+              <a14:hiddenFill xmlns:a14="http://schemas.microsoft.com/office/drawing/2010/main" xmlns:p="http://schemas.openxmlformats.org/presentationml/2006/main" xmlns:r="http://schemas.openxmlformats.org/officeDocument/2006/relationships" xmlns:a="http://schemas.openxmlformats.org/drawingml/2006/main" xmlns="">
                 <a:solidFill>
                   <a:srgbClr val="FFFFFF"/>
                 </a:solidFill>
@@ -11982,10 +11994,129 @@
           </a:extLst>
         </p:spPr>
       </p:pic>
+      <p:sp>
+        <p:nvSpPr>
+          <p:cNvPr id="66" name="Rectangle à coins arrondis 41"/>
+          <p:cNvSpPr/>
+          <p:nvPr/>
+        </p:nvSpPr>
+        <p:spPr>
+          <a:xfrm>
+            <a:off x="3581400" y="2057400"/>
+            <a:ext cx="1584176" cy="1008112"/>
+          </a:xfrm>
+          <a:prstGeom prst="roundRect">
+            <a:avLst/>
+          </a:prstGeom>
+          <a:solidFill>
+            <a:schemeClr val="accent3">
+              <a:lumMod val="40000"/>
+              <a:lumOff val="60000"/>
+            </a:schemeClr>
+          </a:solidFill>
+          <a:ln>
+            <a:noFill/>
+          </a:ln>
+          <a:effectLst>
+            <a:outerShdw blurRad="44450" dist="27940" dir="5400000" algn="ctr">
+              <a:srgbClr val="000000">
+                <a:alpha val="32000"/>
+              </a:srgbClr>
+            </a:outerShdw>
+          </a:effectLst>
+          <a:scene3d>
+            <a:camera prst="orthographicFront">
+              <a:rot lat="0" lon="0" rev="0"/>
+            </a:camera>
+            <a:lightRig rig="balanced" dir="t">
+              <a:rot lat="0" lon="0" rev="8700000"/>
+            </a:lightRig>
+          </a:scene3d>
+          <a:sp3d>
+            <a:bevelT w="190500" h="38100"/>
+          </a:sp3d>
+        </p:spPr>
+        <p:style>
+          <a:lnRef idx="2">
+            <a:schemeClr val="accent1">
+              <a:shade val="50000"/>
+            </a:schemeClr>
+          </a:lnRef>
+          <a:fillRef idx="1">
+            <a:schemeClr val="accent1"/>
+          </a:fillRef>
+          <a:effectRef idx="0">
+            <a:schemeClr val="accent1"/>
+          </a:effectRef>
+          <a:fontRef idx="minor">
+            <a:schemeClr val="lt1"/>
+          </a:fontRef>
+        </p:style>
+        <p:txBody>
+          <a:bodyPr rtlCol="0" anchor="t"/>
+          <a:lstStyle/>
+          <a:p>
+            <a:r>
+              <a:rPr lang="fr-FR" sz="1200" dirty="0" smtClean="0">
+                <a:solidFill>
+                  <a:schemeClr val="tx1"/>
+                </a:solidFill>
+              </a:rPr>
+              <a:t>Catalogue</a:t>
+            </a:r>
+            <a:endParaRPr lang="fr-FR" sz="1200" dirty="0">
+              <a:solidFill>
+                <a:schemeClr val="tx1"/>
+              </a:solidFill>
+            </a:endParaRPr>
+          </a:p>
+        </p:txBody>
+      </p:sp>
+      <p:pic>
+        <p:nvPicPr>
+          <p:cNvPr id="67" name="Picture 2" descr="Logo"/>
+          <p:cNvPicPr>
+            <a:picLocks noChangeAspect="1" noChangeArrowheads="1"/>
+          </p:cNvPicPr>
+          <p:nvPr/>
+        </p:nvPicPr>
+        <p:blipFill>
+          <a:blip r:embed="rId7" cstate="print">
+            <a:extLst>
+              <a:ext uri="{28A0092B-C50C-407E-A947-70E740481C1C}">
+                <a14:useLocalDpi xmlns:a14="http://schemas.microsoft.com/office/drawing/2010/main" xmlns:p="http://schemas.openxmlformats.org/presentationml/2006/main" xmlns:r="http://schemas.openxmlformats.org/officeDocument/2006/relationships" xmlns:a="http://schemas.openxmlformats.org/drawingml/2006/main" xmlns="" val="0"/>
+              </a:ext>
+            </a:extLst>
+          </a:blip>
+          <a:srcRect/>
+          <a:stretch>
+            <a:fillRect/>
+          </a:stretch>
+        </p:blipFill>
+        <p:spPr bwMode="auto">
+          <a:xfrm>
+            <a:off x="3581400" y="1991427"/>
+            <a:ext cx="423238" cy="218373"/>
+          </a:xfrm>
+          <a:prstGeom prst="rect">
+            <a:avLst/>
+          </a:prstGeom>
+          <a:noFill/>
+          <a:extLst>
+            <a:ext uri="{909E8E84-426E-40DD-AFC4-6F175D3DCCD1}">
+              <a14:hiddenFill xmlns:a14="http://schemas.microsoft.com/office/drawing/2010/main" xmlns:p="http://schemas.openxmlformats.org/presentationml/2006/main" xmlns:r="http://schemas.openxmlformats.org/officeDocument/2006/relationships" xmlns:a="http://schemas.openxmlformats.org/drawingml/2006/main" xmlns="">
+                <a:solidFill>
+                  <a:srgbClr val="FFFFFF"/>
+                </a:solidFill>
+              </a14:hiddenFill>
+            </a:ext>
+          </a:extLst>
+        </p:spPr>
+      </p:pic>
     </p:spTree>
     <p:extLst>
       <p:ext uri="{BB962C8B-B14F-4D97-AF65-F5344CB8AC3E}">
-        <p14:creationId xmlns:p14="http://schemas.microsoft.com/office/powerpoint/2010/main" val="2243607340"/>
+        <p14:creationId xmlns:p14="http://schemas.microsoft.com/office/powerpoint/2010/main" xmlns:p="http://schemas.openxmlformats.org/presentationml/2006/main" xmlns:r="http://schemas.openxmlformats.org/officeDocument/2006/relationships" xmlns:a="http://schemas.openxmlformats.org/drawingml/2006/main" xmlns="" val="2243607340"/>
       </p:ext>
     </p:extLst>
   </p:cSld>
@@ -11996,7 +12127,7 @@
 </file>
 
 <file path=ppt/slides/slide8.xml><?xml version="1.0" encoding="utf-8"?>
-<p:sld xmlns:a="http://schemas.openxmlformats.org/drawingml/2006/main" xmlns:r="http://schemas.openxmlformats.org/officeDocument/2006/relationships" xmlns:p="http://schemas.openxmlformats.org/presentationml/2006/main">
+<p:sld xmlns:a="http://schemas.openxmlformats.org/drawingml/2006/main" xmlns:r="http://schemas.openxmlformats.org/officeDocument/2006/relationships" xmlns:mc="http://schemas.openxmlformats.org/markup-compatibility/2006" xmlns:mv="urn:schemas-microsoft-com:mac:vml" xmlns:p="http://schemas.openxmlformats.org/presentationml/2006/main" mc:Ignorable="mv" mc:PreserveAttributes="mv:*">
   <p:cSld>
     <p:spTree>
       <p:nvGrpSpPr>
@@ -13031,7 +13162,7 @@
     </p:spTree>
     <p:extLst>
       <p:ext uri="{BB962C8B-B14F-4D97-AF65-F5344CB8AC3E}">
-        <p14:creationId xmlns:p14="http://schemas.microsoft.com/office/powerpoint/2010/main" val="1141804822"/>
+        <p14:creationId xmlns:p14="http://schemas.microsoft.com/office/powerpoint/2010/main" xmlns:p="http://schemas.openxmlformats.org/presentationml/2006/main" xmlns:r="http://schemas.openxmlformats.org/officeDocument/2006/relationships" xmlns:a="http://schemas.openxmlformats.org/drawingml/2006/main" xmlns="" val="1141804822"/>
       </p:ext>
     </p:extLst>
   </p:cSld>
@@ -13042,7 +13173,7 @@
 </file>
 
 <file path=ppt/slides/slide9.xml><?xml version="1.0" encoding="utf-8"?>
-<p:sld xmlns:a="http://schemas.openxmlformats.org/drawingml/2006/main" xmlns:r="http://schemas.openxmlformats.org/officeDocument/2006/relationships" xmlns:p="http://schemas.openxmlformats.org/presentationml/2006/main">
+<p:sld xmlns:a="http://schemas.openxmlformats.org/drawingml/2006/main" xmlns:r="http://schemas.openxmlformats.org/officeDocument/2006/relationships" xmlns:mc="http://schemas.openxmlformats.org/markup-compatibility/2006" xmlns:mv="urn:schemas-microsoft-com:mac:vml" xmlns:p="http://schemas.openxmlformats.org/presentationml/2006/main" mc:Ignorable="mv" mc:PreserveAttributes="mv:*">
   <p:cSld>
     <p:spTree>
       <p:nvGrpSpPr>
@@ -13783,7 +13914,7 @@
     </p:spTree>
     <p:extLst>
       <p:ext uri="{BB962C8B-B14F-4D97-AF65-F5344CB8AC3E}">
-        <p14:creationId xmlns:p14="http://schemas.microsoft.com/office/powerpoint/2010/main" val="3945179993"/>
+        <p14:creationId xmlns:p14="http://schemas.microsoft.com/office/powerpoint/2010/main" xmlns:p="http://schemas.openxmlformats.org/presentationml/2006/main" xmlns:r="http://schemas.openxmlformats.org/officeDocument/2006/relationships" xmlns:a="http://schemas.openxmlformats.org/drawingml/2006/main" xmlns="" val="3945179993"/>
       </p:ext>
     </p:extLst>
   </p:cSld>

</xml_diff>